<commit_message>
Updates to unit testing with Spring
</commit_message>
<xml_diff>
--- a/presentations/Introduction to Spring Framework Unit Testing Support.pptx
+++ b/presentations/Introduction to Spring Framework Unit Testing Support.pptx
@@ -6,20 +6,17 @@
   </p:sldMasterIdLst>
   <p:sldIdLst>
     <p:sldId id="256" r:id="rId2"/>
-    <p:sldId id="265" r:id="rId3"/>
-    <p:sldId id="269" r:id="rId4"/>
-    <p:sldId id="257" r:id="rId5"/>
-    <p:sldId id="258" r:id="rId6"/>
-    <p:sldId id="259" r:id="rId7"/>
-    <p:sldId id="260" r:id="rId8"/>
-    <p:sldId id="270" r:id="rId9"/>
-    <p:sldId id="261" r:id="rId10"/>
-    <p:sldId id="262" r:id="rId11"/>
-    <p:sldId id="283" r:id="rId12"/>
-    <p:sldId id="284" r:id="rId13"/>
-    <p:sldId id="268" r:id="rId14"/>
-    <p:sldId id="263" r:id="rId15"/>
-    <p:sldId id="264" r:id="rId16"/>
+    <p:sldId id="271" r:id="rId3"/>
+    <p:sldId id="258" r:id="rId4"/>
+    <p:sldId id="259" r:id="rId5"/>
+    <p:sldId id="260" r:id="rId6"/>
+    <p:sldId id="270" r:id="rId7"/>
+    <p:sldId id="261" r:id="rId8"/>
+    <p:sldId id="262" r:id="rId9"/>
+    <p:sldId id="265" r:id="rId10"/>
+    <p:sldId id="269" r:id="rId11"/>
+    <p:sldId id="257" r:id="rId12"/>
+    <p:sldId id="264" r:id="rId13"/>
   </p:sldIdLst>
   <p:sldSz cx="12192000" cy="6858000"/>
   <p:notesSz cx="6858000" cy="9144000"/>
@@ -3451,7 +3448,7 @@
           <p:cNvPr id="2" name="Title 1">
             <a:extLst>
               <a:ext uri="{FF2B5EF4-FFF2-40B4-BE49-F238E27FC236}">
-                <a16:creationId xmlns:a16="http://schemas.microsoft.com/office/drawing/2014/main" id="{0721C84B-4C4A-C94C-8F18-7F1C16D2A1F4}"/>
+                <a16:creationId xmlns:a16="http://schemas.microsoft.com/office/drawing/2014/main" id="{93EEAAD8-965B-D247-BD6A-0A9D5FB06A6E}"/>
               </a:ext>
             </a:extLst>
           </p:cNvPr>
@@ -3468,9 +3465,10 @@
           <a:lstStyle/>
           <a:p>
             <a:r>
-              <a:rPr lang="en-US" dirty="0"/>
-              <a:t>Spring Web Reactive</a:t>
-            </a:r>
+              <a:rPr lang="en-US" dirty="0" err="1"/>
+              <a:t>AopTestUtils</a:t>
+            </a:r>
+            <a:endParaRPr lang="en-US" dirty="0"/>
           </a:p>
         </p:txBody>
       </p:sp>
@@ -3479,7 +3477,7 @@
           <p:cNvPr id="3" name="Content Placeholder 2">
             <a:extLst>
               <a:ext uri="{FF2B5EF4-FFF2-40B4-BE49-F238E27FC236}">
-                <a16:creationId xmlns:a16="http://schemas.microsoft.com/office/drawing/2014/main" id="{145FAC0A-9F40-C942-9675-DED9A8D58FF7}"/>
+                <a16:creationId xmlns:a16="http://schemas.microsoft.com/office/drawing/2014/main" id="{60197950-7A54-D944-9B08-E27A20E34FFD}"/>
               </a:ext>
             </a:extLst>
           </p:cNvPr>
@@ -3495,77 +3493,62 @@
           <a:bodyPr/>
           <a:lstStyle/>
           <a:p>
-            <a:r>
-              <a:rPr lang="en-US" dirty="0"/>
-              <a:t>In order for the mock response to properly implement the write contract and return a write completion handle (that is, </a:t>
-            </a:r>
-            <a:r>
-              <a:rPr lang="en-US" dirty="0">
-                <a:latin typeface="Courier" pitchFamily="2" charset="0"/>
-              </a:rPr>
-              <a:t>Mono&lt;Void&gt;</a:t>
-            </a:r>
-            <a:r>
-              <a:rPr lang="en-US" dirty="0"/>
-              <a:t>), it by default uses a </a:t>
-            </a:r>
-            <a:r>
-              <a:rPr lang="en-US" dirty="0">
-                <a:latin typeface="Courier" pitchFamily="2" charset="0"/>
-              </a:rPr>
-              <a:t>Flux</a:t>
-            </a:r>
-            <a:r>
-              <a:rPr lang="en-US" dirty="0"/>
-              <a:t> with </a:t>
-            </a:r>
-            <a:r>
-              <a:rPr lang="en-US" dirty="0">
-                <a:latin typeface="Courier" pitchFamily="2" charset="0"/>
-              </a:rPr>
-              <a:t>cache().then()</a:t>
-            </a:r>
-            <a:r>
-              <a:rPr lang="en-US" dirty="0"/>
-              <a:t>, which buffers the data and makes it available for assertions in tests. </a:t>
-            </a:r>
-          </a:p>
-          <a:p>
-            <a:pPr lvl="1"/>
-            <a:r>
-              <a:rPr lang="en-US" dirty="0"/>
-              <a:t>Applications can set a custom write function (for example, to test an infinite stream).</a:t>
-            </a:r>
-          </a:p>
-          <a:p>
-            <a:r>
-              <a:rPr lang="en-US" dirty="0"/>
-              <a:t>The </a:t>
-            </a:r>
             <a:r>
               <a:rPr lang="en-US" dirty="0" err="1">
                 <a:latin typeface="Courier" pitchFamily="2" charset="0"/>
               </a:rPr>
-              <a:t>WebTestClient</a:t>
-            </a:r>
-            <a:r>
-              <a:rPr lang="en-US" dirty="0"/>
-              <a:t> builds on the mock request and response to provide support for testing </a:t>
+              <a:t>AopTestUtils</a:t>
+            </a:r>
+            <a:r>
+              <a:rPr lang="en-US" dirty="0"/>
+              <a:t> is a collection of AOP-related utility methods. </a:t>
+            </a:r>
+          </a:p>
+          <a:p>
+            <a:r>
+              <a:rPr lang="en-US" dirty="0"/>
+              <a:t>You can use these methods to obtain a reference to the underlying target object hidden behind one or more Spring proxies. </a:t>
+            </a:r>
+          </a:p>
+          <a:p>
+            <a:pPr lvl="1"/>
+            <a:r>
+              <a:rPr lang="en-US" dirty="0"/>
+              <a:t>For example, if you have configured a bean as a dynamic mock by using a library such as </a:t>
             </a:r>
             <a:r>
               <a:rPr lang="en-US" dirty="0" err="1"/>
-              <a:t>WebFlux</a:t>
-            </a:r>
-            <a:r>
-              <a:rPr lang="en-US" dirty="0"/>
-              <a:t> applications without an HTTP server. </a:t>
-            </a:r>
-          </a:p>
-          <a:p>
-            <a:pPr lvl="1"/>
-            <a:r>
-              <a:rPr lang="en-US" dirty="0"/>
-              <a:t>The client can also be used for end-to-end tests with a running server.</a:t>
+              <a:t>EasyMock</a:t>
+            </a:r>
+            <a:r>
+              <a:rPr lang="en-US" dirty="0"/>
+              <a:t> or Mockito, and the mock is wrapped in a Spring proxy, you may need direct access to the underlying mock to configure expectations on it and perform verifications. </a:t>
+            </a:r>
+          </a:p>
+          <a:p>
+            <a:r>
+              <a:rPr lang="en-US" dirty="0"/>
+              <a:t>For Spring’s core AOP utilities, see </a:t>
+            </a:r>
+            <a:r>
+              <a:rPr lang="en-US" dirty="0" err="1">
+                <a:latin typeface="Courier" pitchFamily="2" charset="0"/>
+              </a:rPr>
+              <a:t>AopUtils</a:t>
+            </a:r>
+            <a:r>
+              <a:rPr lang="en-US" dirty="0"/>
+              <a:t> and </a:t>
+            </a:r>
+            <a:r>
+              <a:rPr lang="en-US" dirty="0" err="1">
+                <a:latin typeface="Courier" pitchFamily="2" charset="0"/>
+              </a:rPr>
+              <a:t>AopProxyUtils</a:t>
+            </a:r>
+            <a:r>
+              <a:rPr lang="en-US" dirty="0"/>
+              <a:t>.</a:t>
             </a:r>
           </a:p>
           <a:p>
@@ -3579,7 +3562,7 @@
     </p:spTree>
     <p:extLst>
       <p:ext uri="{BB962C8B-B14F-4D97-AF65-F5344CB8AC3E}">
-        <p14:creationId xmlns:p14="http://schemas.microsoft.com/office/powerpoint/2010/main" val="3851587936"/>
+        <p14:creationId xmlns:p14="http://schemas.microsoft.com/office/powerpoint/2010/main" val="1717276562"/>
       </p:ext>
     </p:extLst>
   </p:cSld>
@@ -3611,7 +3594,7 @@
           <p:cNvPr id="2" name="Title 1">
             <a:extLst>
               <a:ext uri="{FF2B5EF4-FFF2-40B4-BE49-F238E27FC236}">
-                <a16:creationId xmlns:a16="http://schemas.microsoft.com/office/drawing/2014/main" id="{0721C84B-4C4A-C94C-8F18-7F1C16D2A1F4}"/>
+                <a16:creationId xmlns:a16="http://schemas.microsoft.com/office/drawing/2014/main" id="{BE059C70-14DB-9048-BAEE-8FCD59575F8F}"/>
               </a:ext>
             </a:extLst>
           </p:cNvPr>
@@ -3627,7 +3610,10 @@
           <a:bodyPr/>
           <a:lstStyle/>
           <a:p>
-            <a:endParaRPr lang="en-US"/>
+            <a:r>
+              <a:rPr lang="en-US" dirty="0"/>
+              <a:t>Mock Environment support</a:t>
+            </a:r>
           </a:p>
         </p:txBody>
       </p:sp>
@@ -3636,7 +3622,7 @@
           <p:cNvPr id="3" name="Content Placeholder 2">
             <a:extLst>
               <a:ext uri="{FF2B5EF4-FFF2-40B4-BE49-F238E27FC236}">
-                <a16:creationId xmlns:a16="http://schemas.microsoft.com/office/drawing/2014/main" id="{145FAC0A-9F40-C942-9675-DED9A8D58FF7}"/>
+                <a16:creationId xmlns:a16="http://schemas.microsoft.com/office/drawing/2014/main" id="{528D3533-DB35-7C4B-A917-E784845190A3}"/>
               </a:ext>
             </a:extLst>
           </p:cNvPr>
@@ -3652,14 +3638,76 @@
           <a:bodyPr/>
           <a:lstStyle/>
           <a:p>
-            <a:endParaRPr lang="en-US"/>
+            <a:r>
+              <a:rPr lang="en-US" dirty="0"/>
+              <a:t>The </a:t>
+            </a:r>
+            <a:r>
+              <a:rPr lang="en-US" dirty="0" err="1">
+                <a:latin typeface="Courier" pitchFamily="2" charset="0"/>
+              </a:rPr>
+              <a:t>org.springframework.mock.env</a:t>
+            </a:r>
+            <a:r>
+              <a:rPr lang="en-US" dirty="0">
+                <a:latin typeface="Courier" pitchFamily="2" charset="0"/>
+              </a:rPr>
+              <a:t> </a:t>
+            </a:r>
+            <a:r>
+              <a:rPr lang="en-US" dirty="0"/>
+              <a:t>package contains mock implementations of the </a:t>
+            </a:r>
+            <a:r>
+              <a:rPr lang="en-US" dirty="0">
+                <a:latin typeface="Courier" pitchFamily="2" charset="0"/>
+              </a:rPr>
+              <a:t>Environment</a:t>
+            </a:r>
+            <a:r>
+              <a:rPr lang="en-US" dirty="0"/>
+              <a:t> and </a:t>
+            </a:r>
+            <a:r>
+              <a:rPr lang="en-US" dirty="0" err="1">
+                <a:latin typeface="Courier" pitchFamily="2" charset="0"/>
+              </a:rPr>
+              <a:t>PropertySource</a:t>
+            </a:r>
+            <a:r>
+              <a:rPr lang="en-US" dirty="0"/>
+              <a:t> abstractions. </a:t>
+            </a:r>
+          </a:p>
+          <a:p>
+            <a:pPr lvl="1"/>
+            <a:r>
+              <a:rPr lang="en-US" dirty="0" err="1">
+                <a:latin typeface="Courier" pitchFamily="2" charset="0"/>
+              </a:rPr>
+              <a:t>MockEnvironment</a:t>
+            </a:r>
+            <a:r>
+              <a:rPr lang="en-US" dirty="0"/>
+              <a:t> and </a:t>
+            </a:r>
+            <a:r>
+              <a:rPr lang="en-US" dirty="0" err="1">
+                <a:latin typeface="Courier" pitchFamily="2" charset="0"/>
+              </a:rPr>
+              <a:t>MockPropertySource</a:t>
+            </a:r>
+            <a:r>
+              <a:rPr lang="en-US" dirty="0"/>
+              <a:t> are useful for developing out-of-container tests for code that depends on environment-specific properties.</a:t>
+            </a:r>
           </a:p>
         </p:txBody>
       </p:sp>
     </p:spTree>
     <p:extLst>
       <p:ext uri="{BB962C8B-B14F-4D97-AF65-F5344CB8AC3E}">
-        <p14:creationId xmlns:p14="http://schemas.microsoft.com/office/powerpoint/2010/main" val="1498140747"/>
+        <p14:creationId xmlns:p14="http://schemas.microsoft.com/office/powerpoint/2010/main" val="325043793"/>
       </p:ext>
     </p:extLst>
   </p:cSld>
@@ -3670,246 +3718,6 @@
 </file>
 
 <file path=ppt/slides/slide12.xml><?xml version="1.0" encoding="utf-8"?>
-<p:sld xmlns:a="http://schemas.openxmlformats.org/drawingml/2006/main" xmlns:r="http://schemas.openxmlformats.org/officeDocument/2006/relationships" xmlns:p="http://schemas.openxmlformats.org/presentationml/2006/main">
-  <p:cSld>
-    <p:spTree>
-      <p:nvGrpSpPr>
-        <p:cNvPr id="1" name=""/>
-        <p:cNvGrpSpPr/>
-        <p:nvPr/>
-      </p:nvGrpSpPr>
-      <p:grpSpPr>
-        <a:xfrm>
-          <a:off x="0" y="0"/>
-          <a:ext cx="0" cy="0"/>
-          <a:chOff x="0" y="0"/>
-          <a:chExt cx="0" cy="0"/>
-        </a:xfrm>
-      </p:grpSpPr>
-      <p:sp>
-        <p:nvSpPr>
-          <p:cNvPr id="2" name="Title 1">
-            <a:extLst>
-              <a:ext uri="{FF2B5EF4-FFF2-40B4-BE49-F238E27FC236}">
-                <a16:creationId xmlns:a16="http://schemas.microsoft.com/office/drawing/2014/main" id="{0721C84B-4C4A-C94C-8F18-7F1C16D2A1F4}"/>
-              </a:ext>
-            </a:extLst>
-          </p:cNvPr>
-          <p:cNvSpPr>
-            <a:spLocks noGrp="1"/>
-          </p:cNvSpPr>
-          <p:nvPr>
-            <p:ph type="title"/>
-          </p:nvPr>
-        </p:nvSpPr>
-        <p:spPr/>
-        <p:txBody>
-          <a:bodyPr/>
-          <a:lstStyle/>
-          <a:p>
-            <a:endParaRPr lang="en-US"/>
-          </a:p>
-        </p:txBody>
-      </p:sp>
-      <p:sp>
-        <p:nvSpPr>
-          <p:cNvPr id="3" name="Content Placeholder 2">
-            <a:extLst>
-              <a:ext uri="{FF2B5EF4-FFF2-40B4-BE49-F238E27FC236}">
-                <a16:creationId xmlns:a16="http://schemas.microsoft.com/office/drawing/2014/main" id="{145FAC0A-9F40-C942-9675-DED9A8D58FF7}"/>
-              </a:ext>
-            </a:extLst>
-          </p:cNvPr>
-          <p:cNvSpPr>
-            <a:spLocks noGrp="1"/>
-          </p:cNvSpPr>
-          <p:nvPr>
-            <p:ph idx="1"/>
-          </p:nvPr>
-        </p:nvSpPr>
-        <p:spPr/>
-        <p:txBody>
-          <a:bodyPr/>
-          <a:lstStyle/>
-          <a:p>
-            <a:endParaRPr lang="en-US"/>
-          </a:p>
-        </p:txBody>
-      </p:sp>
-    </p:spTree>
-    <p:extLst>
-      <p:ext uri="{BB962C8B-B14F-4D97-AF65-F5344CB8AC3E}">
-        <p14:creationId xmlns:p14="http://schemas.microsoft.com/office/powerpoint/2010/main" val="1650265637"/>
-      </p:ext>
-    </p:extLst>
-  </p:cSld>
-  <p:clrMapOvr>
-    <a:masterClrMapping/>
-  </p:clrMapOvr>
-</p:sld>
-</file>
-
-<file path=ppt/slides/slide13.xml><?xml version="1.0" encoding="utf-8"?>
-<p:sld xmlns:a="http://schemas.openxmlformats.org/drawingml/2006/main" xmlns:r="http://schemas.openxmlformats.org/officeDocument/2006/relationships" xmlns:p="http://schemas.openxmlformats.org/presentationml/2006/main">
-  <p:cSld>
-    <p:spTree>
-      <p:nvGrpSpPr>
-        <p:cNvPr id="1" name=""/>
-        <p:cNvGrpSpPr/>
-        <p:nvPr/>
-      </p:nvGrpSpPr>
-      <p:grpSpPr>
-        <a:xfrm>
-          <a:off x="0" y="0"/>
-          <a:ext cx="0" cy="0"/>
-          <a:chOff x="0" y="0"/>
-          <a:chExt cx="0" cy="0"/>
-        </a:xfrm>
-      </p:grpSpPr>
-      <p:sp>
-        <p:nvSpPr>
-          <p:cNvPr id="2" name="Title 1">
-            <a:extLst>
-              <a:ext uri="{FF2B5EF4-FFF2-40B4-BE49-F238E27FC236}">
-                <a16:creationId xmlns:a16="http://schemas.microsoft.com/office/drawing/2014/main" id="{0721C84B-4C4A-C94C-8F18-7F1C16D2A1F4}"/>
-              </a:ext>
-            </a:extLst>
-          </p:cNvPr>
-          <p:cNvSpPr>
-            <a:spLocks noGrp="1"/>
-          </p:cNvSpPr>
-          <p:nvPr>
-            <p:ph type="title"/>
-          </p:nvPr>
-        </p:nvSpPr>
-        <p:spPr/>
-        <p:txBody>
-          <a:bodyPr/>
-          <a:lstStyle/>
-          <a:p>
-            <a:endParaRPr lang="en-US"/>
-          </a:p>
-        </p:txBody>
-      </p:sp>
-      <p:sp>
-        <p:nvSpPr>
-          <p:cNvPr id="3" name="Content Placeholder 2">
-            <a:extLst>
-              <a:ext uri="{FF2B5EF4-FFF2-40B4-BE49-F238E27FC236}">
-                <a16:creationId xmlns:a16="http://schemas.microsoft.com/office/drawing/2014/main" id="{145FAC0A-9F40-C942-9675-DED9A8D58FF7}"/>
-              </a:ext>
-            </a:extLst>
-          </p:cNvPr>
-          <p:cNvSpPr>
-            <a:spLocks noGrp="1"/>
-          </p:cNvSpPr>
-          <p:nvPr>
-            <p:ph idx="1"/>
-          </p:nvPr>
-        </p:nvSpPr>
-        <p:spPr/>
-        <p:txBody>
-          <a:bodyPr/>
-          <a:lstStyle/>
-          <a:p>
-            <a:endParaRPr lang="en-US"/>
-          </a:p>
-        </p:txBody>
-      </p:sp>
-    </p:spTree>
-    <p:extLst>
-      <p:ext uri="{BB962C8B-B14F-4D97-AF65-F5344CB8AC3E}">
-        <p14:creationId xmlns:p14="http://schemas.microsoft.com/office/powerpoint/2010/main" val="1764273956"/>
-      </p:ext>
-    </p:extLst>
-  </p:cSld>
-  <p:clrMapOvr>
-    <a:masterClrMapping/>
-  </p:clrMapOvr>
-</p:sld>
-</file>
-
-<file path=ppt/slides/slide14.xml><?xml version="1.0" encoding="utf-8"?>
-<p:sld xmlns:a="http://schemas.openxmlformats.org/drawingml/2006/main" xmlns:r="http://schemas.openxmlformats.org/officeDocument/2006/relationships" xmlns:p="http://schemas.openxmlformats.org/presentationml/2006/main">
-  <p:cSld>
-    <p:spTree>
-      <p:nvGrpSpPr>
-        <p:cNvPr id="1" name=""/>
-        <p:cNvGrpSpPr/>
-        <p:nvPr/>
-      </p:nvGrpSpPr>
-      <p:grpSpPr>
-        <a:xfrm>
-          <a:off x="0" y="0"/>
-          <a:ext cx="0" cy="0"/>
-          <a:chOff x="0" y="0"/>
-          <a:chExt cx="0" cy="0"/>
-        </a:xfrm>
-      </p:grpSpPr>
-      <p:sp>
-        <p:nvSpPr>
-          <p:cNvPr id="2" name="Title 1">
-            <a:extLst>
-              <a:ext uri="{FF2B5EF4-FFF2-40B4-BE49-F238E27FC236}">
-                <a16:creationId xmlns:a16="http://schemas.microsoft.com/office/drawing/2014/main" id="{0CAD8607-3D0E-F34C-A71C-E1FCD84847DA}"/>
-              </a:ext>
-            </a:extLst>
-          </p:cNvPr>
-          <p:cNvSpPr>
-            <a:spLocks noGrp="1"/>
-          </p:cNvSpPr>
-          <p:nvPr>
-            <p:ph type="title"/>
-          </p:nvPr>
-        </p:nvSpPr>
-        <p:spPr/>
-        <p:txBody>
-          <a:bodyPr/>
-          <a:lstStyle/>
-          <a:p>
-            <a:endParaRPr lang="en-US"/>
-          </a:p>
-        </p:txBody>
-      </p:sp>
-      <p:sp>
-        <p:nvSpPr>
-          <p:cNvPr id="3" name="Content Placeholder 2">
-            <a:extLst>
-              <a:ext uri="{FF2B5EF4-FFF2-40B4-BE49-F238E27FC236}">
-                <a16:creationId xmlns:a16="http://schemas.microsoft.com/office/drawing/2014/main" id="{3C783A4D-ADD3-FE47-A802-7E1E33980728}"/>
-              </a:ext>
-            </a:extLst>
-          </p:cNvPr>
-          <p:cNvSpPr>
-            <a:spLocks noGrp="1"/>
-          </p:cNvSpPr>
-          <p:nvPr>
-            <p:ph idx="1"/>
-          </p:nvPr>
-        </p:nvSpPr>
-        <p:spPr/>
-        <p:txBody>
-          <a:bodyPr/>
-          <a:lstStyle/>
-          <a:p>
-            <a:endParaRPr lang="en-US"/>
-          </a:p>
-        </p:txBody>
-      </p:sp>
-    </p:spTree>
-    <p:extLst>
-      <p:ext uri="{BB962C8B-B14F-4D97-AF65-F5344CB8AC3E}">
-        <p14:creationId xmlns:p14="http://schemas.microsoft.com/office/powerpoint/2010/main" val="1482911797"/>
-      </p:ext>
-    </p:extLst>
-  </p:cSld>
-  <p:clrMapOvr>
-    <a:masterClrMapping/>
-  </p:clrMapOvr>
-</p:sld>
-</file>
-
-<file path=ppt/slides/slide15.xml><?xml version="1.0" encoding="utf-8"?>
 <p:sld xmlns:a="http://schemas.openxmlformats.org/drawingml/2006/main" xmlns:r="http://schemas.openxmlformats.org/officeDocument/2006/relationships" xmlns:p="http://schemas.openxmlformats.org/presentationml/2006/main">
   <p:cSld>
     <p:spTree>
@@ -4023,7 +3831,7 @@
           <p:cNvPr id="2" name="Title 1">
             <a:extLst>
               <a:ext uri="{FF2B5EF4-FFF2-40B4-BE49-F238E27FC236}">
-                <a16:creationId xmlns:a16="http://schemas.microsoft.com/office/drawing/2014/main" id="{0721C84B-4C4A-C94C-8F18-7F1C16D2A1F4}"/>
+                <a16:creationId xmlns:a16="http://schemas.microsoft.com/office/drawing/2014/main" id="{6DEC1282-3AA5-894F-BA93-17FFB7AFC888}"/>
               </a:ext>
             </a:extLst>
           </p:cNvPr>
@@ -4041,9 +3849,16 @@
           <a:p>
             <a:r>
               <a:rPr lang="en-US" dirty="0" err="1"/>
-              <a:t>ReflectionTestUtils</a:t>
-            </a:r>
-            <a:endParaRPr lang="en-US" dirty="0"/>
+              <a:t>SpringExtension</a:t>
+            </a:r>
+            <a:r>
+              <a:rPr lang="en-US" dirty="0"/>
+              <a:t> for </a:t>
+            </a:r>
+            <a:r>
+              <a:rPr lang="en-US"/>
+              <a:t>JUnit Jupiter</a:t>
+            </a:r>
           </a:p>
         </p:txBody>
       </p:sp>
@@ -4052,7 +3867,7 @@
           <p:cNvPr id="3" name="Content Placeholder 2">
             <a:extLst>
               <a:ext uri="{FF2B5EF4-FFF2-40B4-BE49-F238E27FC236}">
-                <a16:creationId xmlns:a16="http://schemas.microsoft.com/office/drawing/2014/main" id="{145FAC0A-9F40-C942-9675-DED9A8D58FF7}"/>
+                <a16:creationId xmlns:a16="http://schemas.microsoft.com/office/drawing/2014/main" id="{01F9C6C3-87E2-5445-8A43-953FA83DC261}"/>
               </a:ext>
             </a:extLst>
           </p:cNvPr>
@@ -4065,68 +3880,17 @@
         </p:nvSpPr>
         <p:spPr/>
         <p:txBody>
-          <a:bodyPr>
-            <a:normAutofit/>
-          </a:bodyPr>
-          <a:lstStyle/>
-          <a:p>
-            <a:r>
-              <a:rPr lang="en-US" dirty="0" err="1">
-                <a:latin typeface="Courier" pitchFamily="2" charset="0"/>
-              </a:rPr>
-              <a:t>ReflectionTestUtils</a:t>
-            </a:r>
-            <a:r>
-              <a:rPr lang="en-US" dirty="0"/>
-              <a:t> is a collection of reflection-based utility methods. </a:t>
-            </a:r>
-          </a:p>
-          <a:p>
-            <a:r>
-              <a:rPr lang="en-US" dirty="0"/>
-              <a:t>Use these methods in testing scenarios where you need to </a:t>
-            </a:r>
-          </a:p>
-          <a:p>
-            <a:pPr lvl="1"/>
-            <a:r>
-              <a:rPr lang="en-US" dirty="0"/>
-              <a:t>change the value of a constant, </a:t>
-            </a:r>
-          </a:p>
-          <a:p>
-            <a:pPr lvl="1"/>
-            <a:r>
-              <a:rPr lang="en-US" dirty="0"/>
-              <a:t>set a non-public field, </a:t>
-            </a:r>
-          </a:p>
-          <a:p>
-            <a:pPr lvl="1"/>
-            <a:r>
-              <a:rPr lang="en-US" dirty="0"/>
-              <a:t>invoke a non-public setter method, </a:t>
-            </a:r>
-          </a:p>
-          <a:p>
-            <a:pPr lvl="1"/>
-            <a:r>
-              <a:rPr lang="en-US" dirty="0"/>
-              <a:t>or invoke a non-public configuration or lifecycle callback method </a:t>
-            </a:r>
-          </a:p>
-          <a:p>
-            <a:endParaRPr lang="en-US" dirty="0"/>
-          </a:p>
-          <a:p>
-            <a:endParaRPr lang="en-US" dirty="0"/>
+          <a:bodyPr/>
+          <a:lstStyle/>
+          <a:p>
+            <a:endParaRPr lang="en-US"/>
           </a:p>
         </p:txBody>
       </p:sp>
     </p:spTree>
     <p:extLst>
       <p:ext uri="{BB962C8B-B14F-4D97-AF65-F5344CB8AC3E}">
-        <p14:creationId xmlns:p14="http://schemas.microsoft.com/office/powerpoint/2010/main" val="13085774"/>
+        <p14:creationId xmlns:p14="http://schemas.microsoft.com/office/powerpoint/2010/main" val="3748569043"/>
       </p:ext>
     </p:extLst>
   </p:cSld>
@@ -4158,7 +3922,7 @@
           <p:cNvPr id="2" name="Title 1">
             <a:extLst>
               <a:ext uri="{FF2B5EF4-FFF2-40B4-BE49-F238E27FC236}">
-                <a16:creationId xmlns:a16="http://schemas.microsoft.com/office/drawing/2014/main" id="{93EEAAD8-965B-D247-BD6A-0A9D5FB06A6E}"/>
+                <a16:creationId xmlns:a16="http://schemas.microsoft.com/office/drawing/2014/main" id="{BDB22E06-8907-5D47-AEE0-EFE4022FF600}"/>
               </a:ext>
             </a:extLst>
           </p:cNvPr>
@@ -4175,10 +3939,9 @@
           <a:lstStyle/>
           <a:p>
             <a:r>
-              <a:rPr lang="en-US" dirty="0" err="1"/>
-              <a:t>AopTestUtils</a:t>
-            </a:r>
-            <a:endParaRPr lang="en-US" dirty="0"/>
+              <a:rPr lang="en-US" dirty="0"/>
+              <a:t>Mock Servlet API support</a:t>
+            </a:r>
           </a:p>
         </p:txBody>
       </p:sp>
@@ -4187,7 +3950,7 @@
           <p:cNvPr id="3" name="Content Placeholder 2">
             <a:extLst>
               <a:ext uri="{FF2B5EF4-FFF2-40B4-BE49-F238E27FC236}">
-                <a16:creationId xmlns:a16="http://schemas.microsoft.com/office/drawing/2014/main" id="{60197950-7A54-D944-9B08-E27A20E34FFD}"/>
+                <a16:creationId xmlns:a16="http://schemas.microsoft.com/office/drawing/2014/main" id="{F51E78BE-4CA6-1A43-834B-CDBC31501506}"/>
               </a:ext>
             </a:extLst>
           </p:cNvPr>
@@ -4200,79 +3963,80 @@
         </p:nvSpPr>
         <p:spPr/>
         <p:txBody>
-          <a:bodyPr/>
-          <a:lstStyle/>
-          <a:p>
+          <a:bodyPr>
+            <a:normAutofit/>
+          </a:bodyPr>
+          <a:lstStyle/>
+          <a:p>
+            <a:r>
+              <a:rPr lang="en-US" dirty="0"/>
+              <a:t>The </a:t>
+            </a:r>
             <a:r>
               <a:rPr lang="en-US" dirty="0" err="1">
                 <a:latin typeface="Courier" pitchFamily="2" charset="0"/>
               </a:rPr>
-              <a:t>AopTestUtils</a:t>
-            </a:r>
-            <a:r>
-              <a:rPr lang="en-US" dirty="0"/>
-              <a:t> is a collection of AOP-related utility methods. </a:t>
-            </a:r>
-          </a:p>
-          <a:p>
-            <a:r>
-              <a:rPr lang="en-US" dirty="0"/>
-              <a:t>You can use these methods to obtain a reference to the underlying target object hidden behind one or more Spring proxies. </a:t>
-            </a:r>
-          </a:p>
-          <a:p>
-            <a:pPr lvl="1"/>
-            <a:r>
-              <a:rPr lang="en-US" dirty="0"/>
-              <a:t>For example, if you have configured a bean as a dynamic mock by using a library such as </a:t>
-            </a:r>
-            <a:r>
-              <a:rPr lang="en-US" dirty="0" err="1"/>
-              <a:t>EasyMock</a:t>
-            </a:r>
-            <a:r>
-              <a:rPr lang="en-US" dirty="0"/>
-              <a:t> or Mockito, and the mock is wrapped in a Spring proxy, you may need direct access to the underlying mock to configure expectations on it and perform verifications. </a:t>
-            </a:r>
-          </a:p>
-          <a:p>
-            <a:r>
-              <a:rPr lang="en-US" dirty="0"/>
-              <a:t>For Spring’s core AOP utilities, see </a:t>
-            </a:r>
-            <a:r>
-              <a:rPr lang="en-US" dirty="0" err="1">
+              <a:t>org.springframework.mock.web</a:t>
+            </a:r>
+            <a:r>
+              <a:rPr lang="en-US" dirty="0">
                 <a:latin typeface="Courier" pitchFamily="2" charset="0"/>
               </a:rPr>
-              <a:t>AopUtils</a:t>
-            </a:r>
-            <a:r>
-              <a:rPr lang="en-US" dirty="0"/>
-              <a:t> and </a:t>
-            </a:r>
-            <a:r>
-              <a:rPr lang="en-US" dirty="0" err="1">
-                <a:latin typeface="Courier" pitchFamily="2" charset="0"/>
-              </a:rPr>
-              <a:t>AopProxyUtils</a:t>
-            </a:r>
-            <a:r>
-              <a:rPr lang="en-US" dirty="0"/>
-              <a:t>.</a:t>
-            </a:r>
-          </a:p>
-          <a:p>
-            <a:endParaRPr lang="en-US" dirty="0"/>
-          </a:p>
-          <a:p>
-            <a:endParaRPr lang="en-US" dirty="0"/>
+              <a:t> </a:t>
+            </a:r>
+            <a:r>
+              <a:rPr lang="en-US" dirty="0"/>
+              <a:t>package contains a comprehensive set of Servlet API mock objects.</a:t>
+            </a:r>
+          </a:p>
+          <a:p>
+            <a:pPr lvl="1"/>
+            <a:r>
+              <a:rPr lang="en-US" dirty="0"/>
+              <a:t>Useful for testing web contexts, controllers and filters. </a:t>
+            </a:r>
+          </a:p>
+          <a:p>
+            <a:pPr lvl="1"/>
+            <a:r>
+              <a:rPr lang="en-US" dirty="0"/>
+              <a:t>These mock objects are targeted at usage with Spring’s Web MVC framework.</a:t>
+            </a:r>
+          </a:p>
+          <a:p>
+            <a:r>
+              <a:rPr lang="en-US" dirty="0"/>
+              <a:t>Since Spring Framework 5.0, these mock objects are based on the Servlet 4.0 API.</a:t>
+            </a:r>
+          </a:p>
+          <a:p>
+            <a:r>
+              <a:rPr lang="en-US" dirty="0"/>
+              <a:t>The Spring MVC Test Framework (</a:t>
+            </a:r>
+            <a:r>
+              <a:rPr lang="en-US" i="1" dirty="0"/>
+              <a:t>aka</a:t>
+            </a:r>
+            <a:r>
+              <a:rPr lang="en-US" dirty="0"/>
+              <a:t> </a:t>
+            </a:r>
+            <a:r>
+              <a:rPr lang="en-US" dirty="0" err="1"/>
+              <a:t>MockMvc</a:t>
+            </a:r>
+            <a:r>
+              <a:rPr lang="en-US" dirty="0"/>
+              <a:t>) builds on the mock Servlet API objects to provide an integration testing framework for Spring MVC.</a:t>
+            </a:r>
           </a:p>
         </p:txBody>
       </p:sp>
     </p:spTree>
     <p:extLst>
       <p:ext uri="{BB962C8B-B14F-4D97-AF65-F5344CB8AC3E}">
-        <p14:creationId xmlns:p14="http://schemas.microsoft.com/office/powerpoint/2010/main" val="1717276562"/>
+        <p14:creationId xmlns:p14="http://schemas.microsoft.com/office/powerpoint/2010/main" val="690069578"/>
       </p:ext>
     </p:extLst>
   </p:cSld>
@@ -4304,7 +4068,7 @@
           <p:cNvPr id="2" name="Title 1">
             <a:extLst>
               <a:ext uri="{FF2B5EF4-FFF2-40B4-BE49-F238E27FC236}">
-                <a16:creationId xmlns:a16="http://schemas.microsoft.com/office/drawing/2014/main" id="{BE059C70-14DB-9048-BAEE-8FCD59575F8F}"/>
+                <a16:creationId xmlns:a16="http://schemas.microsoft.com/office/drawing/2014/main" id="{0ACB1337-375E-2245-A7F2-5ADAEF06D81E}"/>
               </a:ext>
             </a:extLst>
           </p:cNvPr>
@@ -4322,7 +4086,15 @@
           <a:p>
             <a:r>
               <a:rPr lang="en-US" dirty="0"/>
-              <a:t>Mock Environment support</a:t>
+              <a:t>Spring MVC testing (aka </a:t>
+            </a:r>
+            <a:r>
+              <a:rPr lang="en-US" dirty="0" err="1"/>
+              <a:t>MockMvc</a:t>
+            </a:r>
+            <a:r>
+              <a:rPr lang="en-US" dirty="0"/>
+              <a:t>)</a:t>
             </a:r>
           </a:p>
         </p:txBody>
@@ -4332,7 +4104,7 @@
           <p:cNvPr id="3" name="Content Placeholder 2">
             <a:extLst>
               <a:ext uri="{FF2B5EF4-FFF2-40B4-BE49-F238E27FC236}">
-                <a16:creationId xmlns:a16="http://schemas.microsoft.com/office/drawing/2014/main" id="{528D3533-DB35-7C4B-A917-E784845190A3}"/>
+                <a16:creationId xmlns:a16="http://schemas.microsoft.com/office/drawing/2014/main" id="{01CB3B59-9643-F348-A490-6422BCB91D84}"/>
               </a:ext>
             </a:extLst>
           </p:cNvPr>
@@ -4345,79 +4117,81 @@
         </p:nvSpPr>
         <p:spPr/>
         <p:txBody>
-          <a:bodyPr/>
-          <a:lstStyle/>
-          <a:p>
-            <a:r>
-              <a:rPr lang="en-US" dirty="0"/>
-              <a:t>The </a:t>
-            </a:r>
-            <a:r>
-              <a:rPr lang="en-US" dirty="0" err="1">
-                <a:latin typeface="Courier" pitchFamily="2" charset="0"/>
-              </a:rPr>
-              <a:t>org.springframework.mock.env</a:t>
-            </a:r>
-            <a:r>
-              <a:rPr lang="en-US" dirty="0">
-                <a:latin typeface="Courier" pitchFamily="2" charset="0"/>
-              </a:rPr>
-              <a:t> </a:t>
-            </a:r>
-            <a:r>
-              <a:rPr lang="en-US" dirty="0"/>
-              <a:t>package contains mock implementations of the </a:t>
-            </a:r>
-            <a:r>
-              <a:rPr lang="en-US" dirty="0">
-                <a:latin typeface="Courier" pitchFamily="2" charset="0"/>
-              </a:rPr>
-              <a:t>Environment</a:t>
-            </a:r>
-            <a:r>
-              <a:rPr lang="en-US" dirty="0"/>
-              <a:t> and </a:t>
-            </a:r>
-            <a:r>
-              <a:rPr lang="en-US" dirty="0" err="1">
-                <a:latin typeface="Courier" pitchFamily="2" charset="0"/>
-              </a:rPr>
-              <a:t>PropertySource</a:t>
-            </a:r>
-            <a:r>
-              <a:rPr lang="en-US" dirty="0"/>
-              <a:t> abstractions. </a:t>
+          <a:bodyPr>
+            <a:normAutofit/>
+          </a:bodyPr>
+          <a:lstStyle/>
+          <a:p>
+            <a:r>
+              <a:rPr lang="en-US" dirty="0"/>
+              <a:t>Provides support for testing Spring MVC applications. </a:t>
             </a:r>
           </a:p>
           <a:p>
             <a:pPr lvl="1"/>
             <a:r>
-              <a:rPr lang="en-US" dirty="0" err="1">
-                <a:latin typeface="Courier" pitchFamily="2" charset="0"/>
-              </a:rPr>
-              <a:t>MockEnvironment</a:t>
-            </a:r>
-            <a:r>
-              <a:rPr lang="en-US" dirty="0"/>
-              <a:t> and </a:t>
-            </a:r>
-            <a:r>
-              <a:rPr lang="en-US" dirty="0" err="1">
-                <a:latin typeface="Courier" pitchFamily="2" charset="0"/>
-              </a:rPr>
-              <a:t>MockPropertySource</a:t>
-            </a:r>
-            <a:r>
-              <a:rPr lang="en-US" dirty="0"/>
-              <a:t> are useful for developing out-of-container tests for code that depends on environment-specific properties.</a:t>
-            </a:r>
+              <a:rPr lang="en-US" dirty="0"/>
+              <a:t>It performs full Spring MVC request handling but via mock request and response objects instead of a running server.</a:t>
+            </a:r>
+          </a:p>
+          <a:p>
+            <a:r>
+              <a:rPr lang="en-US" dirty="0" err="1"/>
+              <a:t>MockMvc</a:t>
+            </a:r>
+            <a:r>
+              <a:rPr lang="en-US" dirty="0"/>
+              <a:t> can be used on its own to perform requests and verify responses. </a:t>
+            </a:r>
+          </a:p>
+          <a:p>
+            <a:r>
+              <a:rPr lang="en-US" dirty="0"/>
+              <a:t>It can also be used through the </a:t>
+            </a:r>
+            <a:r>
+              <a:rPr lang="en-US" dirty="0" err="1"/>
+              <a:t>WebTestClient</a:t>
+            </a:r>
+            <a:r>
+              <a:rPr lang="en-US" dirty="0"/>
+              <a:t> where </a:t>
+            </a:r>
+            <a:r>
+              <a:rPr lang="en-US" dirty="0" err="1"/>
+              <a:t>MockMvc</a:t>
+            </a:r>
+            <a:r>
+              <a:rPr lang="en-US" dirty="0"/>
+              <a:t> is plugged in as the server to handle requests with. </a:t>
+            </a:r>
+          </a:p>
+          <a:p>
+            <a:pPr lvl="1"/>
+            <a:r>
+              <a:rPr lang="en-US" dirty="0"/>
+              <a:t>Advantage: The option to work with higher level objects instead of raw data.</a:t>
+            </a:r>
+          </a:p>
+          <a:p>
+            <a:pPr lvl="1"/>
+            <a:r>
+              <a:rPr lang="en-US" dirty="0"/>
+              <a:t>Advantage: Use full, end-to-end HTTP tests against a live server and use the same test API.</a:t>
+            </a:r>
+          </a:p>
+          <a:p>
+            <a:endParaRPr lang="en-US" dirty="0"/>
+          </a:p>
+          <a:p>
+            <a:endParaRPr lang="en-US" dirty="0"/>
           </a:p>
         </p:txBody>
       </p:sp>
     </p:spTree>
     <p:extLst>
       <p:ext uri="{BB962C8B-B14F-4D97-AF65-F5344CB8AC3E}">
-        <p14:creationId xmlns:p14="http://schemas.microsoft.com/office/powerpoint/2010/main" val="325043793"/>
+        <p14:creationId xmlns:p14="http://schemas.microsoft.com/office/powerpoint/2010/main" val="3431082857"/>
       </p:ext>
     </p:extLst>
   </p:cSld>
@@ -4449,7 +4223,7 @@
           <p:cNvPr id="2" name="Title 1">
             <a:extLst>
               <a:ext uri="{FF2B5EF4-FFF2-40B4-BE49-F238E27FC236}">
-                <a16:creationId xmlns:a16="http://schemas.microsoft.com/office/drawing/2014/main" id="{BDB22E06-8907-5D47-AEE0-EFE4022FF600}"/>
+                <a16:creationId xmlns:a16="http://schemas.microsoft.com/office/drawing/2014/main" id="{3D8AD980-BEFA-BA45-BA79-2E3EE8AA0ECF}"/>
               </a:ext>
             </a:extLst>
           </p:cNvPr>
@@ -4466,8 +4240,12 @@
           <a:lstStyle/>
           <a:p>
             <a:r>
-              <a:rPr lang="en-US" dirty="0"/>
-              <a:t>Mock Servlet API support</a:t>
+              <a:rPr lang="en-US" dirty="0" err="1"/>
+              <a:t>MockMvc</a:t>
+            </a:r>
+            <a:r>
+              <a:rPr lang="en-US" dirty="0"/>
+              <a:t> Details</a:t>
             </a:r>
           </a:p>
         </p:txBody>
@@ -4477,7 +4255,7 @@
           <p:cNvPr id="3" name="Content Placeholder 2">
             <a:extLst>
               <a:ext uri="{FF2B5EF4-FFF2-40B4-BE49-F238E27FC236}">
-                <a16:creationId xmlns:a16="http://schemas.microsoft.com/office/drawing/2014/main" id="{F51E78BE-4CA6-1A43-834B-CDBC31501506}"/>
+                <a16:creationId xmlns:a16="http://schemas.microsoft.com/office/drawing/2014/main" id="{EFC440CD-5D93-D246-BC4D-08A4EE439B45}"/>
               </a:ext>
             </a:extLst>
           </p:cNvPr>
@@ -4490,80 +4268,51 @@
         </p:nvSpPr>
         <p:spPr/>
         <p:txBody>
-          <a:bodyPr>
-            <a:normAutofit/>
-          </a:bodyPr>
-          <a:lstStyle/>
-          <a:p>
-            <a:r>
-              <a:rPr lang="en-US" dirty="0"/>
-              <a:t>The </a:t>
-            </a:r>
+          <a:bodyPr/>
+          <a:lstStyle/>
+          <a:p>
             <a:r>
               <a:rPr lang="en-US" dirty="0" err="1">
                 <a:latin typeface="Courier" pitchFamily="2" charset="0"/>
               </a:rPr>
-              <a:t>org.springframework.mock.web</a:t>
-            </a:r>
-            <a:r>
-              <a:rPr lang="en-US" dirty="0">
+              <a:t>MockMvc</a:t>
+            </a:r>
+            <a:r>
+              <a:rPr lang="en-US" dirty="0"/>
+              <a:t> is a server-side test framework that lets you verify most of the functionality of a Spring MVC application using lightweight and targeted tests. </a:t>
+            </a:r>
+          </a:p>
+          <a:p>
+            <a:r>
+              <a:rPr lang="en-US" dirty="0"/>
+              <a:t>Invokes the </a:t>
+            </a:r>
+            <a:r>
+              <a:rPr lang="en-US" dirty="0" err="1">
                 <a:latin typeface="Courier" pitchFamily="2" charset="0"/>
               </a:rPr>
-              <a:t> </a:t>
-            </a:r>
-            <a:r>
-              <a:rPr lang="en-US" dirty="0"/>
-              <a:t>package contains a comprehensive set of Servlet API mock objects.</a:t>
-            </a:r>
-          </a:p>
-          <a:p>
-            <a:pPr lvl="1"/>
-            <a:r>
-              <a:rPr lang="en-US" dirty="0"/>
-              <a:t>Useful for testing web contexts, controllers and filters. </a:t>
-            </a:r>
-          </a:p>
-          <a:p>
-            <a:pPr lvl="1"/>
-            <a:r>
-              <a:rPr lang="en-US" dirty="0"/>
-              <a:t>These mock objects are targeted at usage with Spring’s Web MVC framework.</a:t>
-            </a:r>
-          </a:p>
-          <a:p>
-            <a:r>
-              <a:rPr lang="en-US" dirty="0"/>
-              <a:t>Since Spring Framework 5.0, these mock objects are based on the Servlet 4.0 API.</a:t>
-            </a:r>
-          </a:p>
-          <a:p>
-            <a:r>
-              <a:rPr lang="en-US" dirty="0"/>
-              <a:t>The Spring MVC Test Framework (</a:t>
-            </a:r>
-            <a:r>
-              <a:rPr lang="en-US" i="1" dirty="0"/>
-              <a:t>aka</a:t>
-            </a:r>
-            <a:r>
-              <a:rPr lang="en-US" dirty="0"/>
-              <a:t> </a:t>
-            </a:r>
-            <a:r>
-              <a:rPr lang="en-US" dirty="0" err="1"/>
-              <a:t>MockMvc</a:t>
-            </a:r>
-            <a:r>
-              <a:rPr lang="en-US" dirty="0"/>
-              <a:t>) builds on the mock Servlet API objects to provide an integration testing framework for Spring MVC.</a:t>
-            </a:r>
+              <a:t>DispacherServlet</a:t>
+            </a:r>
+            <a:r>
+              <a:rPr lang="en-US" dirty="0"/>
+              <a:t>, passing mock implementations of the Servlet API from the spring-test module.</a:t>
+            </a:r>
+          </a:p>
+          <a:p>
+            <a:r>
+              <a:rPr lang="en-US" dirty="0"/>
+              <a:t>Replicates the full Spring MVC request handling without a running server.</a:t>
+            </a:r>
+          </a:p>
+          <a:p>
+            <a:endParaRPr lang="en-US" dirty="0"/>
           </a:p>
         </p:txBody>
       </p:sp>
     </p:spTree>
     <p:extLst>
       <p:ext uri="{BB962C8B-B14F-4D97-AF65-F5344CB8AC3E}">
-        <p14:creationId xmlns:p14="http://schemas.microsoft.com/office/powerpoint/2010/main" val="690069578"/>
+        <p14:creationId xmlns:p14="http://schemas.microsoft.com/office/powerpoint/2010/main" val="3033223310"/>
       </p:ext>
     </p:extLst>
   </p:cSld>
@@ -4595,7 +4344,7 @@
           <p:cNvPr id="2" name="Title 1">
             <a:extLst>
               <a:ext uri="{FF2B5EF4-FFF2-40B4-BE49-F238E27FC236}">
-                <a16:creationId xmlns:a16="http://schemas.microsoft.com/office/drawing/2014/main" id="{0ACB1337-375E-2245-A7F2-5ADAEF06D81E}"/>
+                <a16:creationId xmlns:a16="http://schemas.microsoft.com/office/drawing/2014/main" id="{C7E18CE5-FF41-8F4C-B4D8-3369360AA74C}"/>
               </a:ext>
             </a:extLst>
           </p:cNvPr>
@@ -4612,17 +4361,10 @@
           <a:lstStyle/>
           <a:p>
             <a:r>
-              <a:rPr lang="en-US" dirty="0"/>
-              <a:t>Spring MVC testing (aka </a:t>
-            </a:r>
-            <a:r>
               <a:rPr lang="en-US" dirty="0" err="1"/>
-              <a:t>MockMvc</a:t>
-            </a:r>
-            <a:r>
-              <a:rPr lang="en-US" dirty="0"/>
-              <a:t>)</a:t>
-            </a:r>
+              <a:t>ModelAndViewAssert</a:t>
+            </a:r>
+            <a:endParaRPr lang="en-US" dirty="0"/>
           </a:p>
         </p:txBody>
       </p:sp>
@@ -4631,7 +4373,7 @@
           <p:cNvPr id="3" name="Content Placeholder 2">
             <a:extLst>
               <a:ext uri="{FF2B5EF4-FFF2-40B4-BE49-F238E27FC236}">
-                <a16:creationId xmlns:a16="http://schemas.microsoft.com/office/drawing/2014/main" id="{01CB3B59-9643-F348-A490-6422BCB91D84}"/>
+                <a16:creationId xmlns:a16="http://schemas.microsoft.com/office/drawing/2014/main" id="{9B09F3D5-1FC0-CB47-A155-95418F5FAC50}"/>
               </a:ext>
             </a:extLst>
           </p:cNvPr>
@@ -4644,81 +4386,68 @@
         </p:nvSpPr>
         <p:spPr/>
         <p:txBody>
-          <a:bodyPr>
-            <a:normAutofit/>
-          </a:bodyPr>
-          <a:lstStyle/>
-          <a:p>
-            <a:r>
-              <a:rPr lang="en-US" dirty="0"/>
-              <a:t>Provides support for testing Spring MVC applications. </a:t>
-            </a:r>
-          </a:p>
-          <a:p>
-            <a:pPr lvl="1"/>
-            <a:r>
-              <a:rPr lang="en-US" dirty="0"/>
-              <a:t>It performs full Spring MVC request handling but via mock request and response objects instead of a running server.</a:t>
-            </a:r>
-          </a:p>
-          <a:p>
-            <a:r>
-              <a:rPr lang="en-US" dirty="0" err="1"/>
-              <a:t>MockMvc</a:t>
-            </a:r>
-            <a:r>
-              <a:rPr lang="en-US" dirty="0"/>
-              <a:t> can be used on its own to perform requests and verify responses. </a:t>
-            </a:r>
-          </a:p>
-          <a:p>
-            <a:r>
-              <a:rPr lang="en-US" dirty="0"/>
-              <a:t>It can also be used through the </a:t>
-            </a:r>
-            <a:r>
-              <a:rPr lang="en-US" dirty="0" err="1"/>
-              <a:t>WebTestClient</a:t>
-            </a:r>
-            <a:r>
-              <a:rPr lang="en-US" dirty="0"/>
-              <a:t> where </a:t>
-            </a:r>
-            <a:r>
-              <a:rPr lang="en-US" dirty="0" err="1"/>
-              <a:t>MockMvc</a:t>
-            </a:r>
-            <a:r>
-              <a:rPr lang="en-US" dirty="0"/>
-              <a:t> is plugged in as the server to handle requests with. </a:t>
-            </a:r>
-          </a:p>
-          <a:p>
-            <a:pPr lvl="1"/>
-            <a:r>
-              <a:rPr lang="en-US" dirty="0"/>
-              <a:t>Advantage: The option to work with higher level objects instead of raw data.</a:t>
-            </a:r>
-          </a:p>
-          <a:p>
-            <a:pPr lvl="1"/>
-            <a:r>
-              <a:rPr lang="en-US" dirty="0"/>
-              <a:t>Advantage: Use full, end-to-end HTTP tests against a live server and use the same test API.</a:t>
-            </a:r>
-          </a:p>
-          <a:p>
-            <a:endParaRPr lang="en-US" dirty="0"/>
-          </a:p>
-          <a:p>
-            <a:endParaRPr lang="en-US" dirty="0"/>
+          <a:bodyPr/>
+          <a:lstStyle/>
+          <a:p>
+            <a:r>
+              <a:rPr lang="en-US" dirty="0"/>
+              <a:t>Use in combination with JUnit testing framework for unit tests that deal with Spring MVC </a:t>
+            </a:r>
+            <a:r>
+              <a:rPr lang="en-US" dirty="0" err="1">
+                <a:latin typeface="Courier" pitchFamily="2" charset="0"/>
+              </a:rPr>
+              <a:t>ModelAndView</a:t>
+            </a:r>
+            <a:r>
+              <a:rPr lang="en-US" dirty="0"/>
+              <a:t> objects.</a:t>
+            </a:r>
+          </a:p>
+          <a:p>
+            <a:r>
+              <a:rPr lang="en-US" dirty="0"/>
+              <a:t>A collection of assertions intended to simplify testing scenarios dealing with Spring Web MVC </a:t>
+            </a:r>
+            <a:r>
+              <a:rPr lang="en-US" dirty="0" err="1">
+                <a:latin typeface="Courier" pitchFamily="2" charset="0"/>
+              </a:rPr>
+              <a:t>ModelAndView</a:t>
+            </a:r>
+            <a:r>
+              <a:rPr lang="en-US" dirty="0"/>
+              <a:t> objects.</a:t>
+            </a:r>
+          </a:p>
+          <a:p>
+            <a:r>
+              <a:rPr lang="en-US" dirty="0"/>
+              <a:t>Part of the </a:t>
+            </a:r>
+            <a:r>
+              <a:rPr lang="en-US" dirty="0" err="1">
+                <a:latin typeface="Courier" pitchFamily="2" charset="0"/>
+              </a:rPr>
+              <a:t>org.springframework.test.web</a:t>
+            </a:r>
+            <a:r>
+              <a:rPr lang="en-US" dirty="0">
+                <a:latin typeface="Courier" pitchFamily="2" charset="0"/>
+              </a:rPr>
+              <a:t> </a:t>
+            </a:r>
+            <a:r>
+              <a:rPr lang="en-US" dirty="0"/>
+              <a:t>package.</a:t>
+            </a:r>
           </a:p>
         </p:txBody>
       </p:sp>
     </p:spTree>
     <p:extLst>
       <p:ext uri="{BB962C8B-B14F-4D97-AF65-F5344CB8AC3E}">
-        <p14:creationId xmlns:p14="http://schemas.microsoft.com/office/powerpoint/2010/main" val="3431082857"/>
+        <p14:creationId xmlns:p14="http://schemas.microsoft.com/office/powerpoint/2010/main" val="1538373323"/>
       </p:ext>
     </p:extLst>
   </p:cSld>
@@ -4750,7 +4479,7 @@
           <p:cNvPr id="2" name="Title 1">
             <a:extLst>
               <a:ext uri="{FF2B5EF4-FFF2-40B4-BE49-F238E27FC236}">
-                <a16:creationId xmlns:a16="http://schemas.microsoft.com/office/drawing/2014/main" id="{3D8AD980-BEFA-BA45-BA79-2E3EE8AA0ECF}"/>
+                <a16:creationId xmlns:a16="http://schemas.microsoft.com/office/drawing/2014/main" id="{86C860B7-32F1-AE46-8944-4BDA7C647312}"/>
               </a:ext>
             </a:extLst>
           </p:cNvPr>
@@ -4767,12 +4496,8 @@
           <a:lstStyle/>
           <a:p>
             <a:r>
-              <a:rPr lang="en-US" dirty="0" err="1"/>
-              <a:t>MockMvc</a:t>
-            </a:r>
-            <a:r>
-              <a:rPr lang="en-US" dirty="0"/>
-              <a:t> Details</a:t>
+              <a:rPr lang="en-US" dirty="0"/>
+              <a:t>Spring Web Reactive</a:t>
             </a:r>
           </a:p>
         </p:txBody>
@@ -4782,7 +4507,7 @@
           <p:cNvPr id="3" name="Content Placeholder 2">
             <a:extLst>
               <a:ext uri="{FF2B5EF4-FFF2-40B4-BE49-F238E27FC236}">
-                <a16:creationId xmlns:a16="http://schemas.microsoft.com/office/drawing/2014/main" id="{EFC440CD-5D93-D246-BC4D-08A4EE439B45}"/>
+                <a16:creationId xmlns:a16="http://schemas.microsoft.com/office/drawing/2014/main" id="{52E68A71-BC17-5D4F-BC93-8B7E374EBDDC}"/>
               </a:ext>
             </a:extLst>
           </p:cNvPr>
@@ -4795,51 +4520,152 @@
         </p:nvSpPr>
         <p:spPr/>
         <p:txBody>
-          <a:bodyPr/>
-          <a:lstStyle/>
-          <a:p>
+          <a:bodyPr>
+            <a:normAutofit fontScale="92500" lnSpcReduction="10000"/>
+          </a:bodyPr>
+          <a:lstStyle/>
+          <a:p>
+            <a:r>
+              <a:rPr lang="en-US" dirty="0"/>
+              <a:t>The mock implementations of </a:t>
+            </a:r>
             <a:r>
               <a:rPr lang="en-US" dirty="0" err="1">
                 <a:latin typeface="Courier" pitchFamily="2" charset="0"/>
               </a:rPr>
-              <a:t>MockMvc</a:t>
-            </a:r>
-            <a:r>
-              <a:rPr lang="en-US" dirty="0"/>
-              <a:t> is a server-side test framework that lets you verify most of the functionality of a Spring MVC application using lightweight and targeted tests. </a:t>
-            </a:r>
-          </a:p>
-          <a:p>
-            <a:r>
-              <a:rPr lang="en-US" dirty="0"/>
-              <a:t>Invokes the </a:t>
+              <a:t>ServerHttpRequest</a:t>
+            </a:r>
+            <a:r>
+              <a:rPr lang="en-US" dirty="0"/>
+              <a:t> and </a:t>
             </a:r>
             <a:r>
               <a:rPr lang="en-US" dirty="0" err="1">
                 <a:latin typeface="Courier" pitchFamily="2" charset="0"/>
               </a:rPr>
-              <a:t>DispacherServlet</a:t>
-            </a:r>
-            <a:r>
-              <a:rPr lang="en-US" dirty="0"/>
-              <a:t>, passing mock implementations of the Servlet API from the spring-test module.</a:t>
-            </a:r>
-          </a:p>
-          <a:p>
-            <a:r>
-              <a:rPr lang="en-US" dirty="0"/>
-              <a:t>Replicates the full Spring MVC request handling without a running server.</a:t>
-            </a:r>
-          </a:p>
-          <a:p>
-            <a:endParaRPr lang="en-US" dirty="0"/>
+              <a:t>ServerHttpResponse</a:t>
+            </a:r>
+            <a:r>
+              <a:rPr lang="en-US" dirty="0"/>
+              <a:t> are provided for testing </a:t>
+            </a:r>
+            <a:r>
+              <a:rPr lang="en-US" dirty="0" err="1"/>
+              <a:t>WebFlux</a:t>
+            </a:r>
+            <a:r>
+              <a:rPr lang="en-US" dirty="0"/>
+              <a:t> applications are provided in the </a:t>
+            </a:r>
+            <a:r>
+              <a:rPr lang="en-US" dirty="0" err="1">
+                <a:latin typeface="Courier" pitchFamily="2" charset="0"/>
+              </a:rPr>
+              <a:t>org.springframework.mock.http.server.reactive</a:t>
+            </a:r>
+            <a:r>
+              <a:rPr lang="en-US" dirty="0">
+                <a:latin typeface="Courier" pitchFamily="2" charset="0"/>
+              </a:rPr>
+              <a:t> </a:t>
+            </a:r>
+            <a:r>
+              <a:rPr lang="en-US" dirty="0"/>
+              <a:t>package. </a:t>
+            </a:r>
+          </a:p>
+          <a:p>
+            <a:pPr lvl="1"/>
+            <a:r>
+              <a:rPr lang="en-US" dirty="0"/>
+              <a:t>The </a:t>
+            </a:r>
+            <a:r>
+              <a:rPr lang="en-US" dirty="0" err="1">
+                <a:latin typeface="Courier" pitchFamily="2" charset="0"/>
+              </a:rPr>
+              <a:t>org.springframework.mock.web.server</a:t>
+            </a:r>
+            <a:r>
+              <a:rPr lang="en-US" dirty="0">
+                <a:latin typeface="Courier" pitchFamily="2" charset="0"/>
+              </a:rPr>
+              <a:t> </a:t>
+            </a:r>
+            <a:r>
+              <a:rPr lang="en-US" dirty="0"/>
+              <a:t>package contains a mock </a:t>
+            </a:r>
+            <a:r>
+              <a:rPr lang="en-US" dirty="0" err="1">
+                <a:latin typeface="Courier" pitchFamily="2" charset="0"/>
+              </a:rPr>
+              <a:t>ServerWebExchange</a:t>
+            </a:r>
+            <a:r>
+              <a:rPr lang="en-US" dirty="0"/>
+              <a:t> that depends on those mock implementations.</a:t>
+            </a:r>
+          </a:p>
+          <a:p>
+            <a:r>
+              <a:rPr lang="en-US" dirty="0"/>
+              <a:t>Both </a:t>
+            </a:r>
+            <a:r>
+              <a:rPr lang="en-US" dirty="0" err="1">
+                <a:latin typeface="Courier" pitchFamily="2" charset="0"/>
+              </a:rPr>
+              <a:t>MockServerHttpRequest</a:t>
+            </a:r>
+            <a:r>
+              <a:rPr lang="en-US" dirty="0"/>
+              <a:t> and </a:t>
+            </a:r>
+            <a:r>
+              <a:rPr lang="en-US" dirty="0" err="1">
+                <a:latin typeface="Courier" pitchFamily="2" charset="0"/>
+              </a:rPr>
+              <a:t>MockServerHttpResponse</a:t>
+            </a:r>
+            <a:r>
+              <a:rPr lang="en-US" dirty="0"/>
+              <a:t> extend from the same abstract base classes as server-specific implementations and share behavior with them. </a:t>
+            </a:r>
+          </a:p>
+          <a:p>
+            <a:pPr lvl="1"/>
+            <a:r>
+              <a:rPr lang="en-US" dirty="0"/>
+              <a:t>For example, a mock request is immutable once created, but you can use the </a:t>
+            </a:r>
+            <a:r>
+              <a:rPr lang="en-US" dirty="0">
+                <a:latin typeface="Courier" pitchFamily="2" charset="0"/>
+              </a:rPr>
+              <a:t>mutate()</a:t>
+            </a:r>
+            <a:r>
+              <a:rPr lang="en-US" dirty="0"/>
+              <a:t> method from </a:t>
+            </a:r>
+            <a:r>
+              <a:rPr lang="en-US" dirty="0" err="1">
+                <a:latin typeface="Courier" pitchFamily="2" charset="0"/>
+              </a:rPr>
+              <a:t>ServerHttpRequest</a:t>
+            </a:r>
+            <a:r>
+              <a:rPr lang="en-US" dirty="0"/>
+              <a:t> to create a modified instance.</a:t>
+            </a:r>
           </a:p>
         </p:txBody>
       </p:sp>
     </p:spTree>
     <p:extLst>
       <p:ext uri="{BB962C8B-B14F-4D97-AF65-F5344CB8AC3E}">
-        <p14:creationId xmlns:p14="http://schemas.microsoft.com/office/powerpoint/2010/main" val="3033223310"/>
+        <p14:creationId xmlns:p14="http://schemas.microsoft.com/office/powerpoint/2010/main" val="3096622250"/>
       </p:ext>
     </p:extLst>
   </p:cSld>
@@ -4871,7 +4697,7 @@
           <p:cNvPr id="2" name="Title 1">
             <a:extLst>
               <a:ext uri="{FF2B5EF4-FFF2-40B4-BE49-F238E27FC236}">
-                <a16:creationId xmlns:a16="http://schemas.microsoft.com/office/drawing/2014/main" id="{C7E18CE5-FF41-8F4C-B4D8-3369360AA74C}"/>
+                <a16:creationId xmlns:a16="http://schemas.microsoft.com/office/drawing/2014/main" id="{0721C84B-4C4A-C94C-8F18-7F1C16D2A1F4}"/>
               </a:ext>
             </a:extLst>
           </p:cNvPr>
@@ -4888,10 +4714,9 @@
           <a:lstStyle/>
           <a:p>
             <a:r>
-              <a:rPr lang="en-US" dirty="0" err="1"/>
-              <a:t>ModelAndViewAssert</a:t>
-            </a:r>
-            <a:endParaRPr lang="en-US" dirty="0"/>
+              <a:rPr lang="en-US" dirty="0"/>
+              <a:t>Spring Web Reactive</a:t>
+            </a:r>
           </a:p>
         </p:txBody>
       </p:sp>
@@ -4900,7 +4725,7 @@
           <p:cNvPr id="3" name="Content Placeholder 2">
             <a:extLst>
               <a:ext uri="{FF2B5EF4-FFF2-40B4-BE49-F238E27FC236}">
-                <a16:creationId xmlns:a16="http://schemas.microsoft.com/office/drawing/2014/main" id="{9B09F3D5-1FC0-CB47-A155-95418F5FAC50}"/>
+                <a16:creationId xmlns:a16="http://schemas.microsoft.com/office/drawing/2014/main" id="{145FAC0A-9F40-C942-9675-DED9A8D58FF7}"/>
               </a:ext>
             </a:extLst>
           </p:cNvPr>
@@ -4918,63 +4743,89 @@
           <a:p>
             <a:r>
               <a:rPr lang="en-US" dirty="0"/>
-              <a:t>Use in combination with JUnit testing framework for unit tests that deal with Spring MVC </a:t>
+              <a:t>In order for the mock response to properly implement the write contract and return a write completion handle (that is, </a:t>
+            </a:r>
+            <a:r>
+              <a:rPr lang="en-US" dirty="0">
+                <a:latin typeface="Courier" pitchFamily="2" charset="0"/>
+              </a:rPr>
+              <a:t>Mono&lt;Void&gt;</a:t>
+            </a:r>
+            <a:r>
+              <a:rPr lang="en-US" dirty="0"/>
+              <a:t>), it by default uses a </a:t>
+            </a:r>
+            <a:r>
+              <a:rPr lang="en-US" dirty="0">
+                <a:latin typeface="Courier" pitchFamily="2" charset="0"/>
+              </a:rPr>
+              <a:t>Flux</a:t>
+            </a:r>
+            <a:r>
+              <a:rPr lang="en-US" dirty="0"/>
+              <a:t> with </a:t>
+            </a:r>
+            <a:r>
+              <a:rPr lang="en-US" dirty="0">
+                <a:latin typeface="Courier" pitchFamily="2" charset="0"/>
+              </a:rPr>
+              <a:t>cache().then()</a:t>
+            </a:r>
+            <a:r>
+              <a:rPr lang="en-US" dirty="0"/>
+              <a:t>, which buffers the data and makes it available for assertions in tests. </a:t>
+            </a:r>
+          </a:p>
+          <a:p>
+            <a:pPr lvl="1"/>
+            <a:r>
+              <a:rPr lang="en-US" dirty="0"/>
+              <a:t>Applications can set a custom write function (for example, to test an infinite stream).</a:t>
+            </a:r>
+          </a:p>
+          <a:p>
+            <a:r>
+              <a:rPr lang="en-US" dirty="0"/>
+              <a:t>The </a:t>
             </a:r>
             <a:r>
               <a:rPr lang="en-US" dirty="0" err="1">
                 <a:latin typeface="Courier" pitchFamily="2" charset="0"/>
               </a:rPr>
-              <a:t>ModelAndView</a:t>
-            </a:r>
-            <a:r>
-              <a:rPr lang="en-US" dirty="0"/>
-              <a:t> objects.</a:t>
-            </a:r>
-          </a:p>
-          <a:p>
-            <a:r>
-              <a:rPr lang="en-US" dirty="0"/>
-              <a:t>A collection of assertions intended to simplify testing scenarios dealing with Spring Web MVC </a:t>
-            </a:r>
-            <a:r>
-              <a:rPr lang="en-US" dirty="0" err="1">
-                <a:latin typeface="Courier" pitchFamily="2" charset="0"/>
-              </a:rPr>
-              <a:t>ModelAndView</a:t>
-            </a:r>
-            <a:r>
-              <a:rPr lang="en-US" dirty="0"/>
-              <a:t> objects.</a:t>
-            </a:r>
-          </a:p>
-          <a:p>
-            <a:r>
-              <a:rPr lang="en-US" dirty="0"/>
-              <a:t>Part of the </a:t>
-            </a:r>
-            <a:r>
-              <a:rPr lang="en-US" dirty="0" err="1">
-                <a:latin typeface="Courier" pitchFamily="2" charset="0"/>
-              </a:rPr>
-              <a:t>org.springframework.test.web</a:t>
-            </a:r>
-            <a:r>
-              <a:rPr lang="en-US" dirty="0">
-                <a:latin typeface="Courier" pitchFamily="2" charset="0"/>
-              </a:rPr>
-              <a:t> </a:t>
-            </a:r>
-            <a:r>
-              <a:rPr lang="en-US" dirty="0"/>
-              <a:t>package.</a:t>
-            </a:r>
+              <a:t>WebTestClient</a:t>
+            </a:r>
+            <a:r>
+              <a:rPr lang="en-US" dirty="0"/>
+              <a:t> builds on the mock request and response to provide support for testing </a:t>
+            </a:r>
+            <a:r>
+              <a:rPr lang="en-US" dirty="0" err="1"/>
+              <a:t>WebFlux</a:t>
+            </a:r>
+            <a:r>
+              <a:rPr lang="en-US" dirty="0"/>
+              <a:t> applications without an HTTP server. </a:t>
+            </a:r>
+          </a:p>
+          <a:p>
+            <a:pPr lvl="1"/>
+            <a:r>
+              <a:rPr lang="en-US" dirty="0"/>
+              <a:t>The client can also be used for end-to-end tests with a running server.</a:t>
+            </a:r>
+          </a:p>
+          <a:p>
+            <a:endParaRPr lang="en-US" dirty="0"/>
+          </a:p>
+          <a:p>
+            <a:endParaRPr lang="en-US" dirty="0"/>
           </a:p>
         </p:txBody>
       </p:sp>
     </p:spTree>
     <p:extLst>
       <p:ext uri="{BB962C8B-B14F-4D97-AF65-F5344CB8AC3E}">
-        <p14:creationId xmlns:p14="http://schemas.microsoft.com/office/powerpoint/2010/main" val="1538373323"/>
+        <p14:creationId xmlns:p14="http://schemas.microsoft.com/office/powerpoint/2010/main" val="3851587936"/>
       </p:ext>
     </p:extLst>
   </p:cSld>
@@ -5006,7 +4857,7 @@
           <p:cNvPr id="2" name="Title 1">
             <a:extLst>
               <a:ext uri="{FF2B5EF4-FFF2-40B4-BE49-F238E27FC236}">
-                <a16:creationId xmlns:a16="http://schemas.microsoft.com/office/drawing/2014/main" id="{86C860B7-32F1-AE46-8944-4BDA7C647312}"/>
+                <a16:creationId xmlns:a16="http://schemas.microsoft.com/office/drawing/2014/main" id="{0721C84B-4C4A-C94C-8F18-7F1C16D2A1F4}"/>
               </a:ext>
             </a:extLst>
           </p:cNvPr>
@@ -5023,9 +4874,10 @@
           <a:lstStyle/>
           <a:p>
             <a:r>
-              <a:rPr lang="en-US" dirty="0"/>
-              <a:t>Spring Web Reactive</a:t>
-            </a:r>
+              <a:rPr lang="en-US" dirty="0" err="1"/>
+              <a:t>ReflectionTestUtils</a:t>
+            </a:r>
+            <a:endParaRPr lang="en-US" dirty="0"/>
           </a:p>
         </p:txBody>
       </p:sp>
@@ -5034,7 +4886,7 @@
           <p:cNvPr id="3" name="Content Placeholder 2">
             <a:extLst>
               <a:ext uri="{FF2B5EF4-FFF2-40B4-BE49-F238E27FC236}">
-                <a16:creationId xmlns:a16="http://schemas.microsoft.com/office/drawing/2014/main" id="{52E68A71-BC17-5D4F-BC93-8B7E374EBDDC}"/>
+                <a16:creationId xmlns:a16="http://schemas.microsoft.com/office/drawing/2014/main" id="{145FAC0A-9F40-C942-9675-DED9A8D58FF7}"/>
               </a:ext>
             </a:extLst>
           </p:cNvPr>
@@ -5048,151 +4900,67 @@
         <p:spPr/>
         <p:txBody>
           <a:bodyPr>
-            <a:normAutofit fontScale="92500" lnSpcReduction="10000"/>
+            <a:normAutofit/>
           </a:bodyPr>
           <a:lstStyle/>
           <a:p>
-            <a:r>
-              <a:rPr lang="en-US" dirty="0"/>
-              <a:t>The mock implementations of </a:t>
-            </a:r>
             <a:r>
               <a:rPr lang="en-US" dirty="0" err="1">
                 <a:latin typeface="Courier" pitchFamily="2" charset="0"/>
               </a:rPr>
-              <a:t>ServerHttpRequest</a:t>
-            </a:r>
-            <a:r>
-              <a:rPr lang="en-US" dirty="0"/>
-              <a:t> and </a:t>
-            </a:r>
-            <a:r>
-              <a:rPr lang="en-US" dirty="0" err="1">
-                <a:latin typeface="Courier" pitchFamily="2" charset="0"/>
-              </a:rPr>
-              <a:t>ServerHttpResponse</a:t>
-            </a:r>
-            <a:r>
-              <a:rPr lang="en-US" dirty="0"/>
-              <a:t> are provided for testing </a:t>
-            </a:r>
-            <a:r>
-              <a:rPr lang="en-US" dirty="0" err="1"/>
-              <a:t>WebFlux</a:t>
-            </a:r>
-            <a:r>
-              <a:rPr lang="en-US" dirty="0"/>
-              <a:t> applications are provided in the </a:t>
-            </a:r>
-            <a:r>
-              <a:rPr lang="en-US" dirty="0" err="1">
-                <a:latin typeface="Courier" pitchFamily="2" charset="0"/>
-              </a:rPr>
-              <a:t>org.springframework.mock.http.server.reactive</a:t>
-            </a:r>
-            <a:r>
-              <a:rPr lang="en-US" dirty="0">
-                <a:latin typeface="Courier" pitchFamily="2" charset="0"/>
-              </a:rPr>
-              <a:t> </a:t>
-            </a:r>
-            <a:r>
-              <a:rPr lang="en-US" dirty="0"/>
-              <a:t>package. </a:t>
+              <a:t>ReflectionTestUtils</a:t>
+            </a:r>
+            <a:r>
+              <a:rPr lang="en-US" dirty="0"/>
+              <a:t> is a collection of reflection-based utility methods. </a:t>
+            </a:r>
+          </a:p>
+          <a:p>
+            <a:r>
+              <a:rPr lang="en-US" dirty="0"/>
+              <a:t>Use these methods in testing scenarios where you need to </a:t>
             </a:r>
           </a:p>
           <a:p>
             <a:pPr lvl="1"/>
             <a:r>
               <a:rPr lang="en-US" dirty="0"/>
-              <a:t>The </a:t>
-            </a:r>
-            <a:r>
-              <a:rPr lang="en-US" dirty="0" err="1">
-                <a:latin typeface="Courier" pitchFamily="2" charset="0"/>
-              </a:rPr>
-              <a:t>org.springframework.mock.web.server</a:t>
-            </a:r>
-            <a:r>
-              <a:rPr lang="en-US" dirty="0">
-                <a:latin typeface="Courier" pitchFamily="2" charset="0"/>
-              </a:rPr>
-              <a:t> </a:t>
-            </a:r>
-            <a:r>
-              <a:rPr lang="en-US" dirty="0"/>
-              <a:t>package contains a mock </a:t>
-            </a:r>
-            <a:r>
-              <a:rPr lang="en-US" dirty="0" err="1">
-                <a:latin typeface="Courier" pitchFamily="2" charset="0"/>
-              </a:rPr>
-              <a:t>ServerWebExchange</a:t>
-            </a:r>
-            <a:r>
-              <a:rPr lang="en-US" dirty="0"/>
-              <a:t> that depends on those mock implementations.</a:t>
-            </a:r>
-          </a:p>
-          <a:p>
-            <a:r>
-              <a:rPr lang="en-US" dirty="0"/>
-              <a:t>Both </a:t>
-            </a:r>
-            <a:r>
-              <a:rPr lang="en-US" dirty="0" err="1">
-                <a:latin typeface="Courier" pitchFamily="2" charset="0"/>
-              </a:rPr>
-              <a:t>MockServerHttpRequest</a:t>
-            </a:r>
-            <a:r>
-              <a:rPr lang="en-US" dirty="0"/>
-              <a:t> and </a:t>
-            </a:r>
-            <a:r>
-              <a:rPr lang="en-US" dirty="0" err="1">
-                <a:latin typeface="Courier" pitchFamily="2" charset="0"/>
-              </a:rPr>
-              <a:t>MockServerHttpResponse</a:t>
-            </a:r>
-            <a:r>
-              <a:rPr lang="en-US" dirty="0"/>
-              <a:t> extend from the same abstract base classes as server-specific implementations and share behavior with them. </a:t>
+              <a:t>change the value of a constant, </a:t>
             </a:r>
           </a:p>
           <a:p>
             <a:pPr lvl="1"/>
             <a:r>
               <a:rPr lang="en-US" dirty="0"/>
-              <a:t>For example, a mock request is immutable once created, but you can use the </a:t>
-            </a:r>
-            <a:r>
-              <a:rPr lang="en-US" dirty="0">
-                <a:latin typeface="Courier" pitchFamily="2" charset="0"/>
-              </a:rPr>
-              <a:t>mutate()</a:t>
-            </a:r>
-            <a:r>
-              <a:rPr lang="en-US" dirty="0"/>
-              <a:t> method from </a:t>
-            </a:r>
-            <a:r>
-              <a:rPr lang="en-US" dirty="0" err="1">
-                <a:latin typeface="Courier" pitchFamily="2" charset="0"/>
-              </a:rPr>
-              <a:t>ServerHttpRequest</a:t>
-            </a:r>
-            <a:r>
-              <a:rPr lang="en-US" dirty="0"/>
-              <a:t> to create a modified instance.</a:t>
-            </a:r>
+              <a:t>set a non-public field, </a:t>
+            </a:r>
+          </a:p>
+          <a:p>
+            <a:pPr lvl="1"/>
+            <a:r>
+              <a:rPr lang="en-US" dirty="0"/>
+              <a:t>invoke a non-public setter method, </a:t>
+            </a:r>
+          </a:p>
+          <a:p>
+            <a:pPr lvl="1"/>
+            <a:r>
+              <a:rPr lang="en-US" dirty="0"/>
+              <a:t>or invoke a non-public configuration or lifecycle callback method </a:t>
+            </a:r>
+          </a:p>
+          <a:p>
+            <a:endParaRPr lang="en-US" dirty="0"/>
+          </a:p>
+          <a:p>
+            <a:endParaRPr lang="en-US" dirty="0"/>
           </a:p>
         </p:txBody>
       </p:sp>
     </p:spTree>
     <p:extLst>
       <p:ext uri="{BB962C8B-B14F-4D97-AF65-F5344CB8AC3E}">
-        <p14:creationId xmlns:p14="http://schemas.microsoft.com/office/powerpoint/2010/main" val="3096622250"/>
+        <p14:creationId xmlns:p14="http://schemas.microsoft.com/office/powerpoint/2010/main" val="13085774"/>
       </p:ext>
     </p:extLst>
   </p:cSld>

</xml_diff>

<commit_message>
Updates to Introduction to Spring Framework Unit Testing Support presentation
</commit_message>
<xml_diff>
--- a/presentations/Introduction to Spring Framework Unit Testing Support.pptx
+++ b/presentations/Introduction to Spring Framework Unit Testing Support.pptx
@@ -270,7 +270,7 @@
           <a:p>
             <a:fld id="{B38EF465-D677-F140-82CD-891C0463380E}" type="datetimeFigureOut">
               <a:rPr lang="en-US" smtClean="0"/>
-              <a:t>11/1/21</a:t>
+              <a:t>11/2/21</a:t>
             </a:fld>
             <a:endParaRPr lang="en-US"/>
           </a:p>
@@ -468,7 +468,7 @@
           <a:p>
             <a:fld id="{B38EF465-D677-F140-82CD-891C0463380E}" type="datetimeFigureOut">
               <a:rPr lang="en-US" smtClean="0"/>
-              <a:t>11/1/21</a:t>
+              <a:t>11/2/21</a:t>
             </a:fld>
             <a:endParaRPr lang="en-US"/>
           </a:p>
@@ -676,7 +676,7 @@
           <a:p>
             <a:fld id="{B38EF465-D677-F140-82CD-891C0463380E}" type="datetimeFigureOut">
               <a:rPr lang="en-US" smtClean="0"/>
-              <a:t>11/1/21</a:t>
+              <a:t>11/2/21</a:t>
             </a:fld>
             <a:endParaRPr lang="en-US"/>
           </a:p>
@@ -874,7 +874,7 @@
           <a:p>
             <a:fld id="{B38EF465-D677-F140-82CD-891C0463380E}" type="datetimeFigureOut">
               <a:rPr lang="en-US" smtClean="0"/>
-              <a:t>11/1/21</a:t>
+              <a:t>11/2/21</a:t>
             </a:fld>
             <a:endParaRPr lang="en-US"/>
           </a:p>
@@ -1149,7 +1149,7 @@
           <a:p>
             <a:fld id="{B38EF465-D677-F140-82CD-891C0463380E}" type="datetimeFigureOut">
               <a:rPr lang="en-US" smtClean="0"/>
-              <a:t>11/1/21</a:t>
+              <a:t>11/2/21</a:t>
             </a:fld>
             <a:endParaRPr lang="en-US"/>
           </a:p>
@@ -1414,7 +1414,7 @@
           <a:p>
             <a:fld id="{B38EF465-D677-F140-82CD-891C0463380E}" type="datetimeFigureOut">
               <a:rPr lang="en-US" smtClean="0"/>
-              <a:t>11/1/21</a:t>
+              <a:t>11/2/21</a:t>
             </a:fld>
             <a:endParaRPr lang="en-US"/>
           </a:p>
@@ -1826,7 +1826,7 @@
           <a:p>
             <a:fld id="{B38EF465-D677-F140-82CD-891C0463380E}" type="datetimeFigureOut">
               <a:rPr lang="en-US" smtClean="0"/>
-              <a:t>11/1/21</a:t>
+              <a:t>11/2/21</a:t>
             </a:fld>
             <a:endParaRPr lang="en-US"/>
           </a:p>
@@ -1967,7 +1967,7 @@
           <a:p>
             <a:fld id="{B38EF465-D677-F140-82CD-891C0463380E}" type="datetimeFigureOut">
               <a:rPr lang="en-US" smtClean="0"/>
-              <a:t>11/1/21</a:t>
+              <a:t>11/2/21</a:t>
             </a:fld>
             <a:endParaRPr lang="en-US"/>
           </a:p>
@@ -2080,7 +2080,7 @@
           <a:p>
             <a:fld id="{B38EF465-D677-F140-82CD-891C0463380E}" type="datetimeFigureOut">
               <a:rPr lang="en-US" smtClean="0"/>
-              <a:t>11/1/21</a:t>
+              <a:t>11/2/21</a:t>
             </a:fld>
             <a:endParaRPr lang="en-US"/>
           </a:p>
@@ -2391,7 +2391,7 @@
           <a:p>
             <a:fld id="{B38EF465-D677-F140-82CD-891C0463380E}" type="datetimeFigureOut">
               <a:rPr lang="en-US" smtClean="0"/>
-              <a:t>11/1/21</a:t>
+              <a:t>11/2/21</a:t>
             </a:fld>
             <a:endParaRPr lang="en-US"/>
           </a:p>
@@ -2679,7 +2679,7 @@
           <a:p>
             <a:fld id="{B38EF465-D677-F140-82CD-891C0463380E}" type="datetimeFigureOut">
               <a:rPr lang="en-US" smtClean="0"/>
-              <a:t>11/1/21</a:t>
+              <a:t>11/2/21</a:t>
             </a:fld>
             <a:endParaRPr lang="en-US"/>
           </a:p>
@@ -2920,7 +2920,7 @@
           <a:p>
             <a:fld id="{B38EF465-D677-F140-82CD-891C0463380E}" type="datetimeFigureOut">
               <a:rPr lang="en-US" smtClean="0"/>
-              <a:t>11/1/21</a:t>
+              <a:t>11/2/21</a:t>
             </a:fld>
             <a:endParaRPr lang="en-US"/>
           </a:p>
@@ -3569,6 +3569,217 @@
   <p:clrMapOvr>
     <a:masterClrMapping/>
   </p:clrMapOvr>
+  <p:timing>
+    <p:tnLst>
+      <p:par>
+        <p:cTn id="1" dur="indefinite" restart="never" nodeType="tmRoot">
+          <p:childTnLst>
+            <p:seq concurrent="1" nextAc="seek">
+              <p:cTn id="2" dur="indefinite" nodeType="mainSeq">
+                <p:childTnLst>
+                  <p:par>
+                    <p:cTn id="3" fill="hold">
+                      <p:stCondLst>
+                        <p:cond delay="indefinite"/>
+                      </p:stCondLst>
+                      <p:childTnLst>
+                        <p:par>
+                          <p:cTn id="4" fill="hold">
+                            <p:stCondLst>
+                              <p:cond delay="0"/>
+                            </p:stCondLst>
+                            <p:childTnLst>
+                              <p:par>
+                                <p:cTn id="5" presetID="1" presetClass="entr" presetSubtype="0" fill="hold" grpId="0" nodeType="clickEffect">
+                                  <p:stCondLst>
+                                    <p:cond delay="0"/>
+                                  </p:stCondLst>
+                                  <p:childTnLst>
+                                    <p:set>
+                                      <p:cBhvr>
+                                        <p:cTn id="6" dur="1" fill="hold">
+                                          <p:stCondLst>
+                                            <p:cond delay="0"/>
+                                          </p:stCondLst>
+                                        </p:cTn>
+                                        <p:tgtEl>
+                                          <p:spTgt spid="3">
+                                            <p:txEl>
+                                              <p:pRg st="0" end="0"/>
+                                            </p:txEl>
+                                          </p:spTgt>
+                                        </p:tgtEl>
+                                        <p:attrNameLst>
+                                          <p:attrName>style.visibility</p:attrName>
+                                        </p:attrNameLst>
+                                      </p:cBhvr>
+                                      <p:to>
+                                        <p:strVal val="visible"/>
+                                      </p:to>
+                                    </p:set>
+                                  </p:childTnLst>
+                                </p:cTn>
+                              </p:par>
+                            </p:childTnLst>
+                          </p:cTn>
+                        </p:par>
+                      </p:childTnLst>
+                    </p:cTn>
+                  </p:par>
+                  <p:par>
+                    <p:cTn id="7" fill="hold">
+                      <p:stCondLst>
+                        <p:cond delay="indefinite"/>
+                      </p:stCondLst>
+                      <p:childTnLst>
+                        <p:par>
+                          <p:cTn id="8" fill="hold">
+                            <p:stCondLst>
+                              <p:cond delay="0"/>
+                            </p:stCondLst>
+                            <p:childTnLst>
+                              <p:par>
+                                <p:cTn id="9" presetID="1" presetClass="entr" presetSubtype="0" fill="hold" grpId="0" nodeType="clickEffect">
+                                  <p:stCondLst>
+                                    <p:cond delay="0"/>
+                                  </p:stCondLst>
+                                  <p:childTnLst>
+                                    <p:set>
+                                      <p:cBhvr>
+                                        <p:cTn id="10" dur="1" fill="hold">
+                                          <p:stCondLst>
+                                            <p:cond delay="0"/>
+                                          </p:stCondLst>
+                                        </p:cTn>
+                                        <p:tgtEl>
+                                          <p:spTgt spid="3">
+                                            <p:txEl>
+                                              <p:pRg st="1" end="1"/>
+                                            </p:txEl>
+                                          </p:spTgt>
+                                        </p:tgtEl>
+                                        <p:attrNameLst>
+                                          <p:attrName>style.visibility</p:attrName>
+                                        </p:attrNameLst>
+                                      </p:cBhvr>
+                                      <p:to>
+                                        <p:strVal val="visible"/>
+                                      </p:to>
+                                    </p:set>
+                                  </p:childTnLst>
+                                </p:cTn>
+                              </p:par>
+                              <p:par>
+                                <p:cTn id="11" presetID="1" presetClass="entr" presetSubtype="0" fill="hold" grpId="0" nodeType="withEffect">
+                                  <p:stCondLst>
+                                    <p:cond delay="0"/>
+                                  </p:stCondLst>
+                                  <p:childTnLst>
+                                    <p:set>
+                                      <p:cBhvr>
+                                        <p:cTn id="12" dur="1" fill="hold">
+                                          <p:stCondLst>
+                                            <p:cond delay="0"/>
+                                          </p:stCondLst>
+                                        </p:cTn>
+                                        <p:tgtEl>
+                                          <p:spTgt spid="3">
+                                            <p:txEl>
+                                              <p:pRg st="2" end="2"/>
+                                            </p:txEl>
+                                          </p:spTgt>
+                                        </p:tgtEl>
+                                        <p:attrNameLst>
+                                          <p:attrName>style.visibility</p:attrName>
+                                        </p:attrNameLst>
+                                      </p:cBhvr>
+                                      <p:to>
+                                        <p:strVal val="visible"/>
+                                      </p:to>
+                                    </p:set>
+                                  </p:childTnLst>
+                                </p:cTn>
+                              </p:par>
+                            </p:childTnLst>
+                          </p:cTn>
+                        </p:par>
+                      </p:childTnLst>
+                    </p:cTn>
+                  </p:par>
+                  <p:par>
+                    <p:cTn id="13" fill="hold">
+                      <p:stCondLst>
+                        <p:cond delay="indefinite"/>
+                      </p:stCondLst>
+                      <p:childTnLst>
+                        <p:par>
+                          <p:cTn id="14" fill="hold">
+                            <p:stCondLst>
+                              <p:cond delay="0"/>
+                            </p:stCondLst>
+                            <p:childTnLst>
+                              <p:par>
+                                <p:cTn id="15" presetID="1" presetClass="entr" presetSubtype="0" fill="hold" grpId="0" nodeType="clickEffect">
+                                  <p:stCondLst>
+                                    <p:cond delay="0"/>
+                                  </p:stCondLst>
+                                  <p:childTnLst>
+                                    <p:set>
+                                      <p:cBhvr>
+                                        <p:cTn id="16" dur="1" fill="hold">
+                                          <p:stCondLst>
+                                            <p:cond delay="0"/>
+                                          </p:stCondLst>
+                                        </p:cTn>
+                                        <p:tgtEl>
+                                          <p:spTgt spid="3">
+                                            <p:txEl>
+                                              <p:pRg st="3" end="3"/>
+                                            </p:txEl>
+                                          </p:spTgt>
+                                        </p:tgtEl>
+                                        <p:attrNameLst>
+                                          <p:attrName>style.visibility</p:attrName>
+                                        </p:attrNameLst>
+                                      </p:cBhvr>
+                                      <p:to>
+                                        <p:strVal val="visible"/>
+                                      </p:to>
+                                    </p:set>
+                                  </p:childTnLst>
+                                </p:cTn>
+                              </p:par>
+                            </p:childTnLst>
+                          </p:cTn>
+                        </p:par>
+                      </p:childTnLst>
+                    </p:cTn>
+                  </p:par>
+                </p:childTnLst>
+              </p:cTn>
+              <p:prevCondLst>
+                <p:cond evt="onPrev" delay="0">
+                  <p:tgtEl>
+                    <p:sldTgt/>
+                  </p:tgtEl>
+                </p:cond>
+              </p:prevCondLst>
+              <p:nextCondLst>
+                <p:cond evt="onNext" delay="0">
+                  <p:tgtEl>
+                    <p:sldTgt/>
+                  </p:tgtEl>
+                </p:cond>
+              </p:nextCondLst>
+            </p:seq>
+          </p:childTnLst>
+        </p:cTn>
+      </p:par>
+    </p:tnLst>
+    <p:bldLst>
+      <p:bldP spid="3" grpId="0" build="p"/>
+    </p:bldLst>
+  </p:timing>
 </p:sld>
 </file>
 
@@ -3714,6 +3925,119 @@
   <p:clrMapOvr>
     <a:masterClrMapping/>
   </p:clrMapOvr>
+  <p:timing>
+    <p:tnLst>
+      <p:par>
+        <p:cTn id="1" dur="indefinite" restart="never" nodeType="tmRoot">
+          <p:childTnLst>
+            <p:seq concurrent="1" nextAc="seek">
+              <p:cTn id="2" dur="indefinite" nodeType="mainSeq">
+                <p:childTnLst>
+                  <p:par>
+                    <p:cTn id="3" fill="hold">
+                      <p:stCondLst>
+                        <p:cond delay="indefinite"/>
+                      </p:stCondLst>
+                      <p:childTnLst>
+                        <p:par>
+                          <p:cTn id="4" fill="hold">
+                            <p:stCondLst>
+                              <p:cond delay="0"/>
+                            </p:stCondLst>
+                            <p:childTnLst>
+                              <p:par>
+                                <p:cTn id="5" presetID="1" presetClass="entr" presetSubtype="0" fill="hold" grpId="0" nodeType="clickEffect">
+                                  <p:stCondLst>
+                                    <p:cond delay="0"/>
+                                  </p:stCondLst>
+                                  <p:childTnLst>
+                                    <p:set>
+                                      <p:cBhvr>
+                                        <p:cTn id="6" dur="1" fill="hold">
+                                          <p:stCondLst>
+                                            <p:cond delay="0"/>
+                                          </p:stCondLst>
+                                        </p:cTn>
+                                        <p:tgtEl>
+                                          <p:spTgt spid="3">
+                                            <p:txEl>
+                                              <p:pRg st="0" end="0"/>
+                                            </p:txEl>
+                                          </p:spTgt>
+                                        </p:tgtEl>
+                                        <p:attrNameLst>
+                                          <p:attrName>style.visibility</p:attrName>
+                                        </p:attrNameLst>
+                                      </p:cBhvr>
+                                      <p:to>
+                                        <p:strVal val="visible"/>
+                                      </p:to>
+                                    </p:set>
+                                  </p:childTnLst>
+                                </p:cTn>
+                              </p:par>
+                              <p:par>
+                                <p:cTn id="7" presetID="1" presetClass="entr" presetSubtype="0" fill="hold" grpId="0" nodeType="withEffect">
+                                  <p:stCondLst>
+                                    <p:cond delay="0"/>
+                                  </p:stCondLst>
+                                  <p:childTnLst>
+                                    <p:set>
+                                      <p:cBhvr>
+                                        <p:cTn id="8" dur="1" fill="hold">
+                                          <p:stCondLst>
+                                            <p:cond delay="0"/>
+                                          </p:stCondLst>
+                                        </p:cTn>
+                                        <p:tgtEl>
+                                          <p:spTgt spid="3">
+                                            <p:txEl>
+                                              <p:pRg st="1" end="1"/>
+                                            </p:txEl>
+                                          </p:spTgt>
+                                        </p:tgtEl>
+                                        <p:attrNameLst>
+                                          <p:attrName>style.visibility</p:attrName>
+                                        </p:attrNameLst>
+                                      </p:cBhvr>
+                                      <p:to>
+                                        <p:strVal val="visible"/>
+                                      </p:to>
+                                    </p:set>
+                                  </p:childTnLst>
+                                </p:cTn>
+                              </p:par>
+                            </p:childTnLst>
+                          </p:cTn>
+                        </p:par>
+                      </p:childTnLst>
+                    </p:cTn>
+                  </p:par>
+                </p:childTnLst>
+              </p:cTn>
+              <p:prevCondLst>
+                <p:cond evt="onPrev" delay="0">
+                  <p:tgtEl>
+                    <p:sldTgt/>
+                  </p:tgtEl>
+                </p:cond>
+              </p:prevCondLst>
+              <p:nextCondLst>
+                <p:cond evt="onNext" delay="0">
+                  <p:tgtEl>
+                    <p:sldTgt/>
+                  </p:tgtEl>
+                </p:cond>
+              </p:nextCondLst>
+            </p:seq>
+          </p:childTnLst>
+        </p:cTn>
+      </p:par>
+    </p:tnLst>
+    <p:bldLst>
+      <p:bldP spid="3" grpId="0" build="p"/>
+    </p:bldLst>
+  </p:timing>
 </p:sld>
 </file>
 
@@ -3911,34 +4235,68 @@
           <a:p>
             <a:r>
               <a:rPr lang="en-US" dirty="0"/>
-              <a:t>To use this extension, simply annotate a JUnit Jupiter based test class with @</a:t>
-            </a:r>
-            <a:r>
-              <a:rPr lang="en-US" dirty="0" err="1"/>
+              <a:t>To use this extension, simply annotate a JUnit Jupiter based test class with </a:t>
+            </a:r>
+            <a:r>
+              <a:rPr lang="en-US" dirty="0">
+                <a:latin typeface="Courier" pitchFamily="2" charset="0"/>
+              </a:rPr>
+              <a:t>@</a:t>
+            </a:r>
+            <a:r>
+              <a:rPr lang="en-US" dirty="0" err="1">
+                <a:latin typeface="Courier" pitchFamily="2" charset="0"/>
+              </a:rPr>
               <a:t>ExtendWith</a:t>
             </a:r>
             <a:r>
-              <a:rPr lang="en-US" dirty="0"/>
+              <a:rPr lang="en-US" dirty="0">
+                <a:latin typeface="Courier" pitchFamily="2" charset="0"/>
+              </a:rPr>
               <a:t>(</a:t>
             </a:r>
             <a:r>
-              <a:rPr lang="en-US" dirty="0" err="1"/>
+              <a:rPr lang="en-US" dirty="0" err="1">
+                <a:latin typeface="Courier" pitchFamily="2" charset="0"/>
+              </a:rPr>
               <a:t>SpringExtension.class</a:t>
             </a:r>
             <a:r>
-              <a:rPr lang="en-US" dirty="0"/>
-              <a:t>), @</a:t>
-            </a:r>
-            <a:r>
-              <a:rPr lang="en-US" dirty="0" err="1"/>
+              <a:rPr lang="en-US" dirty="0">
+                <a:latin typeface="Courier" pitchFamily="2" charset="0"/>
+              </a:rPr>
+              <a:t>)</a:t>
+            </a:r>
+            <a:r>
+              <a:rPr lang="en-US" dirty="0"/>
+              <a:t>, </a:t>
+            </a:r>
+            <a:r>
+              <a:rPr lang="en-US" dirty="0">
+                <a:latin typeface="Courier" pitchFamily="2" charset="0"/>
+              </a:rPr>
+              <a:t>@</a:t>
+            </a:r>
+            <a:r>
+              <a:rPr lang="en-US" dirty="0" err="1">
+                <a:latin typeface="Courier" pitchFamily="2" charset="0"/>
+              </a:rPr>
               <a:t>SpringJUnitConfig</a:t>
             </a:r>
             <a:r>
               <a:rPr lang="en-US" dirty="0"/>
-              <a:t>, or @</a:t>
-            </a:r>
-            <a:r>
-              <a:rPr lang="en-US" dirty="0" err="1"/>
+              <a:t>, or </a:t>
+            </a:r>
+            <a:r>
+              <a:rPr lang="en-US" dirty="0">
+                <a:latin typeface="Courier" pitchFamily="2" charset="0"/>
+              </a:rPr>
+              <a:t>@</a:t>
+            </a:r>
+            <a:r>
+              <a:rPr lang="en-US" dirty="0" err="1">
+                <a:latin typeface="Courier" pitchFamily="2" charset="0"/>
+              </a:rPr>
               <a:t>SpringJUnitWebConfig</a:t>
             </a:r>
             <a:r>
@@ -3961,6 +4319,137 @@
   <p:clrMapOvr>
     <a:masterClrMapping/>
   </p:clrMapOvr>
+  <p:timing>
+    <p:tnLst>
+      <p:par>
+        <p:cTn id="1" dur="indefinite" restart="never" nodeType="tmRoot">
+          <p:childTnLst>
+            <p:seq concurrent="1" nextAc="seek">
+              <p:cTn id="2" dur="indefinite" nodeType="mainSeq">
+                <p:childTnLst>
+                  <p:par>
+                    <p:cTn id="3" fill="hold">
+                      <p:stCondLst>
+                        <p:cond delay="indefinite"/>
+                      </p:stCondLst>
+                      <p:childTnLst>
+                        <p:par>
+                          <p:cTn id="4" fill="hold">
+                            <p:stCondLst>
+                              <p:cond delay="0"/>
+                            </p:stCondLst>
+                            <p:childTnLst>
+                              <p:par>
+                                <p:cTn id="5" presetID="1" presetClass="entr" presetSubtype="0" fill="hold" grpId="0" nodeType="clickEffect">
+                                  <p:stCondLst>
+                                    <p:cond delay="0"/>
+                                  </p:stCondLst>
+                                  <p:childTnLst>
+                                    <p:set>
+                                      <p:cBhvr>
+                                        <p:cTn id="6" dur="1" fill="hold">
+                                          <p:stCondLst>
+                                            <p:cond delay="0"/>
+                                          </p:stCondLst>
+                                        </p:cTn>
+                                        <p:tgtEl>
+                                          <p:spTgt spid="3">
+                                            <p:txEl>
+                                              <p:pRg st="0" end="0"/>
+                                            </p:txEl>
+                                          </p:spTgt>
+                                        </p:tgtEl>
+                                        <p:attrNameLst>
+                                          <p:attrName>style.visibility</p:attrName>
+                                        </p:attrNameLst>
+                                      </p:cBhvr>
+                                      <p:to>
+                                        <p:strVal val="visible"/>
+                                      </p:to>
+                                    </p:set>
+                                  </p:childTnLst>
+                                </p:cTn>
+                              </p:par>
+                            </p:childTnLst>
+                          </p:cTn>
+                        </p:par>
+                      </p:childTnLst>
+                    </p:cTn>
+                  </p:par>
+                  <p:par>
+                    <p:cTn id="7" fill="hold">
+                      <p:stCondLst>
+                        <p:cond delay="indefinite"/>
+                      </p:stCondLst>
+                      <p:childTnLst>
+                        <p:par>
+                          <p:cTn id="8" fill="hold">
+                            <p:stCondLst>
+                              <p:cond delay="0"/>
+                            </p:stCondLst>
+                            <p:childTnLst>
+                              <p:par>
+                                <p:cTn id="9" presetID="1" presetClass="entr" presetSubtype="0" fill="hold" grpId="0" nodeType="clickEffect">
+                                  <p:stCondLst>
+                                    <p:cond delay="0"/>
+                                  </p:stCondLst>
+                                  <p:childTnLst>
+                                    <p:set>
+                                      <p:cBhvr>
+                                        <p:cTn id="10" dur="1" fill="hold">
+                                          <p:stCondLst>
+                                            <p:cond delay="0"/>
+                                          </p:stCondLst>
+                                        </p:cTn>
+                                        <p:tgtEl>
+                                          <p:spTgt spid="3">
+                                            <p:txEl>
+                                              <p:pRg st="1" end="1"/>
+                                            </p:txEl>
+                                          </p:spTgt>
+                                        </p:tgtEl>
+                                        <p:attrNameLst>
+                                          <p:attrName>style.visibility</p:attrName>
+                                        </p:attrNameLst>
+                                      </p:cBhvr>
+                                      <p:to>
+                                        <p:strVal val="visible"/>
+                                      </p:to>
+                                    </p:set>
+                                  </p:childTnLst>
+                                </p:cTn>
+                              </p:par>
+                            </p:childTnLst>
+                          </p:cTn>
+                        </p:par>
+                      </p:childTnLst>
+                    </p:cTn>
+                  </p:par>
+                </p:childTnLst>
+              </p:cTn>
+              <p:prevCondLst>
+                <p:cond evt="onPrev" delay="0">
+                  <p:tgtEl>
+                    <p:sldTgt/>
+                  </p:tgtEl>
+                </p:cond>
+              </p:prevCondLst>
+              <p:nextCondLst>
+                <p:cond evt="onNext" delay="0">
+                  <p:tgtEl>
+                    <p:sldTgt/>
+                  </p:tgtEl>
+                </p:cond>
+              </p:nextCondLst>
+            </p:seq>
+          </p:childTnLst>
+        </p:cTn>
+      </p:par>
+    </p:tnLst>
+    <p:bldLst>
+      <p:bldP spid="3" grpId="0" build="p"/>
+    </p:bldLst>
+  </p:timing>
 </p:sld>
 </file>
 
@@ -4107,6 +4596,248 @@
   <p:clrMapOvr>
     <a:masterClrMapping/>
   </p:clrMapOvr>
+  <p:timing>
+    <p:tnLst>
+      <p:par>
+        <p:cTn id="1" dur="indefinite" restart="never" nodeType="tmRoot">
+          <p:childTnLst>
+            <p:seq concurrent="1" nextAc="seek">
+              <p:cTn id="2" dur="indefinite" nodeType="mainSeq">
+                <p:childTnLst>
+                  <p:par>
+                    <p:cTn id="3" fill="hold">
+                      <p:stCondLst>
+                        <p:cond delay="indefinite"/>
+                      </p:stCondLst>
+                      <p:childTnLst>
+                        <p:par>
+                          <p:cTn id="4" fill="hold">
+                            <p:stCondLst>
+                              <p:cond delay="0"/>
+                            </p:stCondLst>
+                            <p:childTnLst>
+                              <p:par>
+                                <p:cTn id="5" presetID="1" presetClass="entr" presetSubtype="0" fill="hold" grpId="0" nodeType="clickEffect">
+                                  <p:stCondLst>
+                                    <p:cond delay="0"/>
+                                  </p:stCondLst>
+                                  <p:childTnLst>
+                                    <p:set>
+                                      <p:cBhvr>
+                                        <p:cTn id="6" dur="1" fill="hold">
+                                          <p:stCondLst>
+                                            <p:cond delay="0"/>
+                                          </p:stCondLst>
+                                        </p:cTn>
+                                        <p:tgtEl>
+                                          <p:spTgt spid="3">
+                                            <p:txEl>
+                                              <p:pRg st="0" end="0"/>
+                                            </p:txEl>
+                                          </p:spTgt>
+                                        </p:tgtEl>
+                                        <p:attrNameLst>
+                                          <p:attrName>style.visibility</p:attrName>
+                                        </p:attrNameLst>
+                                      </p:cBhvr>
+                                      <p:to>
+                                        <p:strVal val="visible"/>
+                                      </p:to>
+                                    </p:set>
+                                  </p:childTnLst>
+                                </p:cTn>
+                              </p:par>
+                              <p:par>
+                                <p:cTn id="7" presetID="1" presetClass="entr" presetSubtype="0" fill="hold" grpId="0" nodeType="withEffect">
+                                  <p:stCondLst>
+                                    <p:cond delay="0"/>
+                                  </p:stCondLst>
+                                  <p:childTnLst>
+                                    <p:set>
+                                      <p:cBhvr>
+                                        <p:cTn id="8" dur="1" fill="hold">
+                                          <p:stCondLst>
+                                            <p:cond delay="0"/>
+                                          </p:stCondLst>
+                                        </p:cTn>
+                                        <p:tgtEl>
+                                          <p:spTgt spid="3">
+                                            <p:txEl>
+                                              <p:pRg st="1" end="1"/>
+                                            </p:txEl>
+                                          </p:spTgt>
+                                        </p:tgtEl>
+                                        <p:attrNameLst>
+                                          <p:attrName>style.visibility</p:attrName>
+                                        </p:attrNameLst>
+                                      </p:cBhvr>
+                                      <p:to>
+                                        <p:strVal val="visible"/>
+                                      </p:to>
+                                    </p:set>
+                                  </p:childTnLst>
+                                </p:cTn>
+                              </p:par>
+                              <p:par>
+                                <p:cTn id="9" presetID="1" presetClass="entr" presetSubtype="0" fill="hold" grpId="0" nodeType="withEffect">
+                                  <p:stCondLst>
+                                    <p:cond delay="0"/>
+                                  </p:stCondLst>
+                                  <p:childTnLst>
+                                    <p:set>
+                                      <p:cBhvr>
+                                        <p:cTn id="10" dur="1" fill="hold">
+                                          <p:stCondLst>
+                                            <p:cond delay="0"/>
+                                          </p:stCondLst>
+                                        </p:cTn>
+                                        <p:tgtEl>
+                                          <p:spTgt spid="3">
+                                            <p:txEl>
+                                              <p:pRg st="2" end="2"/>
+                                            </p:txEl>
+                                          </p:spTgt>
+                                        </p:tgtEl>
+                                        <p:attrNameLst>
+                                          <p:attrName>style.visibility</p:attrName>
+                                        </p:attrNameLst>
+                                      </p:cBhvr>
+                                      <p:to>
+                                        <p:strVal val="visible"/>
+                                      </p:to>
+                                    </p:set>
+                                  </p:childTnLst>
+                                </p:cTn>
+                              </p:par>
+                            </p:childTnLst>
+                          </p:cTn>
+                        </p:par>
+                      </p:childTnLst>
+                    </p:cTn>
+                  </p:par>
+                  <p:par>
+                    <p:cTn id="11" fill="hold">
+                      <p:stCondLst>
+                        <p:cond delay="indefinite"/>
+                      </p:stCondLst>
+                      <p:childTnLst>
+                        <p:par>
+                          <p:cTn id="12" fill="hold">
+                            <p:stCondLst>
+                              <p:cond delay="0"/>
+                            </p:stCondLst>
+                            <p:childTnLst>
+                              <p:par>
+                                <p:cTn id="13" presetID="1" presetClass="entr" presetSubtype="0" fill="hold" grpId="0" nodeType="clickEffect">
+                                  <p:stCondLst>
+                                    <p:cond delay="0"/>
+                                  </p:stCondLst>
+                                  <p:childTnLst>
+                                    <p:set>
+                                      <p:cBhvr>
+                                        <p:cTn id="14" dur="1" fill="hold">
+                                          <p:stCondLst>
+                                            <p:cond delay="0"/>
+                                          </p:stCondLst>
+                                        </p:cTn>
+                                        <p:tgtEl>
+                                          <p:spTgt spid="3">
+                                            <p:txEl>
+                                              <p:pRg st="3" end="3"/>
+                                            </p:txEl>
+                                          </p:spTgt>
+                                        </p:tgtEl>
+                                        <p:attrNameLst>
+                                          <p:attrName>style.visibility</p:attrName>
+                                        </p:attrNameLst>
+                                      </p:cBhvr>
+                                      <p:to>
+                                        <p:strVal val="visible"/>
+                                      </p:to>
+                                    </p:set>
+                                  </p:childTnLst>
+                                </p:cTn>
+                              </p:par>
+                            </p:childTnLst>
+                          </p:cTn>
+                        </p:par>
+                      </p:childTnLst>
+                    </p:cTn>
+                  </p:par>
+                  <p:par>
+                    <p:cTn id="15" fill="hold">
+                      <p:stCondLst>
+                        <p:cond delay="indefinite"/>
+                      </p:stCondLst>
+                      <p:childTnLst>
+                        <p:par>
+                          <p:cTn id="16" fill="hold">
+                            <p:stCondLst>
+                              <p:cond delay="0"/>
+                            </p:stCondLst>
+                            <p:childTnLst>
+                              <p:par>
+                                <p:cTn id="17" presetID="1" presetClass="entr" presetSubtype="0" fill="hold" grpId="0" nodeType="clickEffect">
+                                  <p:stCondLst>
+                                    <p:cond delay="0"/>
+                                  </p:stCondLst>
+                                  <p:childTnLst>
+                                    <p:set>
+                                      <p:cBhvr>
+                                        <p:cTn id="18" dur="1" fill="hold">
+                                          <p:stCondLst>
+                                            <p:cond delay="0"/>
+                                          </p:stCondLst>
+                                        </p:cTn>
+                                        <p:tgtEl>
+                                          <p:spTgt spid="3">
+                                            <p:txEl>
+                                              <p:pRg st="4" end="4"/>
+                                            </p:txEl>
+                                          </p:spTgt>
+                                        </p:tgtEl>
+                                        <p:attrNameLst>
+                                          <p:attrName>style.visibility</p:attrName>
+                                        </p:attrNameLst>
+                                      </p:cBhvr>
+                                      <p:to>
+                                        <p:strVal val="visible"/>
+                                      </p:to>
+                                    </p:set>
+                                  </p:childTnLst>
+                                </p:cTn>
+                              </p:par>
+                            </p:childTnLst>
+                          </p:cTn>
+                        </p:par>
+                      </p:childTnLst>
+                    </p:cTn>
+                  </p:par>
+                </p:childTnLst>
+              </p:cTn>
+              <p:prevCondLst>
+                <p:cond evt="onPrev" delay="0">
+                  <p:tgtEl>
+                    <p:sldTgt/>
+                  </p:tgtEl>
+                </p:cond>
+              </p:prevCondLst>
+              <p:nextCondLst>
+                <p:cond evt="onNext" delay="0">
+                  <p:tgtEl>
+                    <p:sldTgt/>
+                  </p:tgtEl>
+                </p:cond>
+              </p:nextCondLst>
+            </p:seq>
+          </p:childTnLst>
+        </p:cTn>
+      </p:par>
+    </p:tnLst>
+    <p:bldLst>
+      <p:bldP spid="3" grpId="0" build="p"/>
+    </p:bldLst>
+  </p:timing>
 </p:sld>
 </file>
 
@@ -4262,6 +4993,279 @@
   <p:clrMapOvr>
     <a:masterClrMapping/>
   </p:clrMapOvr>
+  <p:timing>
+    <p:tnLst>
+      <p:par>
+        <p:cTn id="1" dur="indefinite" restart="never" nodeType="tmRoot">
+          <p:childTnLst>
+            <p:seq concurrent="1" nextAc="seek">
+              <p:cTn id="2" dur="indefinite" nodeType="mainSeq">
+                <p:childTnLst>
+                  <p:par>
+                    <p:cTn id="3" fill="hold">
+                      <p:stCondLst>
+                        <p:cond delay="indefinite"/>
+                      </p:stCondLst>
+                      <p:childTnLst>
+                        <p:par>
+                          <p:cTn id="4" fill="hold">
+                            <p:stCondLst>
+                              <p:cond delay="0"/>
+                            </p:stCondLst>
+                            <p:childTnLst>
+                              <p:par>
+                                <p:cTn id="5" presetID="1" presetClass="entr" presetSubtype="0" fill="hold" grpId="0" nodeType="clickEffect">
+                                  <p:stCondLst>
+                                    <p:cond delay="0"/>
+                                  </p:stCondLst>
+                                  <p:childTnLst>
+                                    <p:set>
+                                      <p:cBhvr>
+                                        <p:cTn id="6" dur="1" fill="hold">
+                                          <p:stCondLst>
+                                            <p:cond delay="0"/>
+                                          </p:stCondLst>
+                                        </p:cTn>
+                                        <p:tgtEl>
+                                          <p:spTgt spid="3">
+                                            <p:txEl>
+                                              <p:pRg st="0" end="0"/>
+                                            </p:txEl>
+                                          </p:spTgt>
+                                        </p:tgtEl>
+                                        <p:attrNameLst>
+                                          <p:attrName>style.visibility</p:attrName>
+                                        </p:attrNameLst>
+                                      </p:cBhvr>
+                                      <p:to>
+                                        <p:strVal val="visible"/>
+                                      </p:to>
+                                    </p:set>
+                                  </p:childTnLst>
+                                </p:cTn>
+                              </p:par>
+                              <p:par>
+                                <p:cTn id="7" presetID="1" presetClass="entr" presetSubtype="0" fill="hold" grpId="0" nodeType="withEffect">
+                                  <p:stCondLst>
+                                    <p:cond delay="0"/>
+                                  </p:stCondLst>
+                                  <p:childTnLst>
+                                    <p:set>
+                                      <p:cBhvr>
+                                        <p:cTn id="8" dur="1" fill="hold">
+                                          <p:stCondLst>
+                                            <p:cond delay="0"/>
+                                          </p:stCondLst>
+                                        </p:cTn>
+                                        <p:tgtEl>
+                                          <p:spTgt spid="3">
+                                            <p:txEl>
+                                              <p:pRg st="1" end="1"/>
+                                            </p:txEl>
+                                          </p:spTgt>
+                                        </p:tgtEl>
+                                        <p:attrNameLst>
+                                          <p:attrName>style.visibility</p:attrName>
+                                        </p:attrNameLst>
+                                      </p:cBhvr>
+                                      <p:to>
+                                        <p:strVal val="visible"/>
+                                      </p:to>
+                                    </p:set>
+                                  </p:childTnLst>
+                                </p:cTn>
+                              </p:par>
+                            </p:childTnLst>
+                          </p:cTn>
+                        </p:par>
+                      </p:childTnLst>
+                    </p:cTn>
+                  </p:par>
+                  <p:par>
+                    <p:cTn id="9" fill="hold">
+                      <p:stCondLst>
+                        <p:cond delay="indefinite"/>
+                      </p:stCondLst>
+                      <p:childTnLst>
+                        <p:par>
+                          <p:cTn id="10" fill="hold">
+                            <p:stCondLst>
+                              <p:cond delay="0"/>
+                            </p:stCondLst>
+                            <p:childTnLst>
+                              <p:par>
+                                <p:cTn id="11" presetID="1" presetClass="entr" presetSubtype="0" fill="hold" grpId="0" nodeType="clickEffect">
+                                  <p:stCondLst>
+                                    <p:cond delay="0"/>
+                                  </p:stCondLst>
+                                  <p:childTnLst>
+                                    <p:set>
+                                      <p:cBhvr>
+                                        <p:cTn id="12" dur="1" fill="hold">
+                                          <p:stCondLst>
+                                            <p:cond delay="0"/>
+                                          </p:stCondLst>
+                                        </p:cTn>
+                                        <p:tgtEl>
+                                          <p:spTgt spid="3">
+                                            <p:txEl>
+                                              <p:pRg st="2" end="2"/>
+                                            </p:txEl>
+                                          </p:spTgt>
+                                        </p:tgtEl>
+                                        <p:attrNameLst>
+                                          <p:attrName>style.visibility</p:attrName>
+                                        </p:attrNameLst>
+                                      </p:cBhvr>
+                                      <p:to>
+                                        <p:strVal val="visible"/>
+                                      </p:to>
+                                    </p:set>
+                                  </p:childTnLst>
+                                </p:cTn>
+                              </p:par>
+                            </p:childTnLst>
+                          </p:cTn>
+                        </p:par>
+                      </p:childTnLst>
+                    </p:cTn>
+                  </p:par>
+                  <p:par>
+                    <p:cTn id="13" fill="hold">
+                      <p:stCondLst>
+                        <p:cond delay="indefinite"/>
+                      </p:stCondLst>
+                      <p:childTnLst>
+                        <p:par>
+                          <p:cTn id="14" fill="hold">
+                            <p:stCondLst>
+                              <p:cond delay="0"/>
+                            </p:stCondLst>
+                            <p:childTnLst>
+                              <p:par>
+                                <p:cTn id="15" presetID="1" presetClass="entr" presetSubtype="0" fill="hold" grpId="0" nodeType="clickEffect">
+                                  <p:stCondLst>
+                                    <p:cond delay="0"/>
+                                  </p:stCondLst>
+                                  <p:childTnLst>
+                                    <p:set>
+                                      <p:cBhvr>
+                                        <p:cTn id="16" dur="1" fill="hold">
+                                          <p:stCondLst>
+                                            <p:cond delay="0"/>
+                                          </p:stCondLst>
+                                        </p:cTn>
+                                        <p:tgtEl>
+                                          <p:spTgt spid="3">
+                                            <p:txEl>
+                                              <p:pRg st="3" end="3"/>
+                                            </p:txEl>
+                                          </p:spTgt>
+                                        </p:tgtEl>
+                                        <p:attrNameLst>
+                                          <p:attrName>style.visibility</p:attrName>
+                                        </p:attrNameLst>
+                                      </p:cBhvr>
+                                      <p:to>
+                                        <p:strVal val="visible"/>
+                                      </p:to>
+                                    </p:set>
+                                  </p:childTnLst>
+                                </p:cTn>
+                              </p:par>
+                              <p:par>
+                                <p:cTn id="17" presetID="1" presetClass="entr" presetSubtype="0" fill="hold" grpId="0" nodeType="withEffect">
+                                  <p:stCondLst>
+                                    <p:cond delay="0"/>
+                                  </p:stCondLst>
+                                  <p:childTnLst>
+                                    <p:set>
+                                      <p:cBhvr>
+                                        <p:cTn id="18" dur="1" fill="hold">
+                                          <p:stCondLst>
+                                            <p:cond delay="0"/>
+                                          </p:stCondLst>
+                                        </p:cTn>
+                                        <p:tgtEl>
+                                          <p:spTgt spid="3">
+                                            <p:txEl>
+                                              <p:pRg st="4" end="4"/>
+                                            </p:txEl>
+                                          </p:spTgt>
+                                        </p:tgtEl>
+                                        <p:attrNameLst>
+                                          <p:attrName>style.visibility</p:attrName>
+                                        </p:attrNameLst>
+                                      </p:cBhvr>
+                                      <p:to>
+                                        <p:strVal val="visible"/>
+                                      </p:to>
+                                    </p:set>
+                                  </p:childTnLst>
+                                </p:cTn>
+                              </p:par>
+                              <p:par>
+                                <p:cTn id="19" presetID="1" presetClass="entr" presetSubtype="0" fill="hold" grpId="0" nodeType="withEffect">
+                                  <p:stCondLst>
+                                    <p:cond delay="0"/>
+                                  </p:stCondLst>
+                                  <p:childTnLst>
+                                    <p:set>
+                                      <p:cBhvr>
+                                        <p:cTn id="20" dur="1" fill="hold">
+                                          <p:stCondLst>
+                                            <p:cond delay="0"/>
+                                          </p:stCondLst>
+                                        </p:cTn>
+                                        <p:tgtEl>
+                                          <p:spTgt spid="3">
+                                            <p:txEl>
+                                              <p:pRg st="5" end="5"/>
+                                            </p:txEl>
+                                          </p:spTgt>
+                                        </p:tgtEl>
+                                        <p:attrNameLst>
+                                          <p:attrName>style.visibility</p:attrName>
+                                        </p:attrNameLst>
+                                      </p:cBhvr>
+                                      <p:to>
+                                        <p:strVal val="visible"/>
+                                      </p:to>
+                                    </p:set>
+                                  </p:childTnLst>
+                                </p:cTn>
+                              </p:par>
+                            </p:childTnLst>
+                          </p:cTn>
+                        </p:par>
+                      </p:childTnLst>
+                    </p:cTn>
+                  </p:par>
+                </p:childTnLst>
+              </p:cTn>
+              <p:prevCondLst>
+                <p:cond evt="onPrev" delay="0">
+                  <p:tgtEl>
+                    <p:sldTgt/>
+                  </p:tgtEl>
+                </p:cond>
+              </p:prevCondLst>
+              <p:nextCondLst>
+                <p:cond evt="onNext" delay="0">
+                  <p:tgtEl>
+                    <p:sldTgt/>
+                  </p:tgtEl>
+                </p:cond>
+              </p:nextCondLst>
+            </p:seq>
+          </p:childTnLst>
+        </p:cTn>
+      </p:par>
+    </p:tnLst>
+    <p:bldLst>
+      <p:bldP spid="3" grpId="0" build="p"/>
+    </p:bldLst>
+  </p:timing>
 </p:sld>
 </file>
 
@@ -4383,6 +5387,186 @@
   <p:clrMapOvr>
     <a:masterClrMapping/>
   </p:clrMapOvr>
+  <p:timing>
+    <p:tnLst>
+      <p:par>
+        <p:cTn id="1" dur="indefinite" restart="never" nodeType="tmRoot">
+          <p:childTnLst>
+            <p:seq concurrent="1" nextAc="seek">
+              <p:cTn id="2" dur="indefinite" nodeType="mainSeq">
+                <p:childTnLst>
+                  <p:par>
+                    <p:cTn id="3" fill="hold">
+                      <p:stCondLst>
+                        <p:cond delay="indefinite"/>
+                      </p:stCondLst>
+                      <p:childTnLst>
+                        <p:par>
+                          <p:cTn id="4" fill="hold">
+                            <p:stCondLst>
+                              <p:cond delay="0"/>
+                            </p:stCondLst>
+                            <p:childTnLst>
+                              <p:par>
+                                <p:cTn id="5" presetID="1" presetClass="entr" presetSubtype="0" fill="hold" grpId="0" nodeType="clickEffect">
+                                  <p:stCondLst>
+                                    <p:cond delay="0"/>
+                                  </p:stCondLst>
+                                  <p:childTnLst>
+                                    <p:set>
+                                      <p:cBhvr>
+                                        <p:cTn id="6" dur="1" fill="hold">
+                                          <p:stCondLst>
+                                            <p:cond delay="0"/>
+                                          </p:stCondLst>
+                                        </p:cTn>
+                                        <p:tgtEl>
+                                          <p:spTgt spid="3">
+                                            <p:txEl>
+                                              <p:pRg st="0" end="0"/>
+                                            </p:txEl>
+                                          </p:spTgt>
+                                        </p:tgtEl>
+                                        <p:attrNameLst>
+                                          <p:attrName>style.visibility</p:attrName>
+                                        </p:attrNameLst>
+                                      </p:cBhvr>
+                                      <p:to>
+                                        <p:strVal val="visible"/>
+                                      </p:to>
+                                    </p:set>
+                                  </p:childTnLst>
+                                </p:cTn>
+                              </p:par>
+                            </p:childTnLst>
+                          </p:cTn>
+                        </p:par>
+                      </p:childTnLst>
+                    </p:cTn>
+                  </p:par>
+                  <p:par>
+                    <p:cTn id="7" fill="hold">
+                      <p:stCondLst>
+                        <p:cond delay="indefinite"/>
+                      </p:stCondLst>
+                      <p:childTnLst>
+                        <p:par>
+                          <p:cTn id="8" fill="hold">
+                            <p:stCondLst>
+                              <p:cond delay="0"/>
+                            </p:stCondLst>
+                            <p:childTnLst>
+                              <p:par>
+                                <p:cTn id="9" presetID="1" presetClass="entr" presetSubtype="0" fill="hold" grpId="0" nodeType="clickEffect">
+                                  <p:stCondLst>
+                                    <p:cond delay="0"/>
+                                  </p:stCondLst>
+                                  <p:childTnLst>
+                                    <p:set>
+                                      <p:cBhvr>
+                                        <p:cTn id="10" dur="1" fill="hold">
+                                          <p:stCondLst>
+                                            <p:cond delay="0"/>
+                                          </p:stCondLst>
+                                        </p:cTn>
+                                        <p:tgtEl>
+                                          <p:spTgt spid="3">
+                                            <p:txEl>
+                                              <p:pRg st="1" end="1"/>
+                                            </p:txEl>
+                                          </p:spTgt>
+                                        </p:tgtEl>
+                                        <p:attrNameLst>
+                                          <p:attrName>style.visibility</p:attrName>
+                                        </p:attrNameLst>
+                                      </p:cBhvr>
+                                      <p:to>
+                                        <p:strVal val="visible"/>
+                                      </p:to>
+                                    </p:set>
+                                  </p:childTnLst>
+                                </p:cTn>
+                              </p:par>
+                            </p:childTnLst>
+                          </p:cTn>
+                        </p:par>
+                      </p:childTnLst>
+                    </p:cTn>
+                  </p:par>
+                  <p:par>
+                    <p:cTn id="11" fill="hold">
+                      <p:stCondLst>
+                        <p:cond delay="indefinite"/>
+                      </p:stCondLst>
+                      <p:childTnLst>
+                        <p:par>
+                          <p:cTn id="12" fill="hold">
+                            <p:stCondLst>
+                              <p:cond delay="0"/>
+                            </p:stCondLst>
+                            <p:childTnLst>
+                              <p:par>
+                                <p:cTn id="13" presetID="1" presetClass="entr" presetSubtype="0" fill="hold" grpId="0" nodeType="clickEffect">
+                                  <p:stCondLst>
+                                    <p:cond delay="0"/>
+                                  </p:stCondLst>
+                                  <p:childTnLst>
+                                    <p:set>
+                                      <p:cBhvr>
+                                        <p:cTn id="14" dur="1" fill="hold">
+                                          <p:stCondLst>
+                                            <p:cond delay="0"/>
+                                          </p:stCondLst>
+                                        </p:cTn>
+                                        <p:tgtEl>
+                                          <p:spTgt spid="3">
+                                            <p:txEl>
+                                              <p:pRg st="2" end="2"/>
+                                            </p:txEl>
+                                          </p:spTgt>
+                                        </p:tgtEl>
+                                        <p:attrNameLst>
+                                          <p:attrName>style.visibility</p:attrName>
+                                        </p:attrNameLst>
+                                      </p:cBhvr>
+                                      <p:to>
+                                        <p:strVal val="visible"/>
+                                      </p:to>
+                                    </p:set>
+                                  </p:childTnLst>
+                                </p:cTn>
+                              </p:par>
+                            </p:childTnLst>
+                          </p:cTn>
+                        </p:par>
+                      </p:childTnLst>
+                    </p:cTn>
+                  </p:par>
+                </p:childTnLst>
+              </p:cTn>
+              <p:prevCondLst>
+                <p:cond evt="onPrev" delay="0">
+                  <p:tgtEl>
+                    <p:sldTgt/>
+                  </p:tgtEl>
+                </p:cond>
+              </p:prevCondLst>
+              <p:nextCondLst>
+                <p:cond evt="onNext" delay="0">
+                  <p:tgtEl>
+                    <p:sldTgt/>
+                  </p:tgtEl>
+                </p:cond>
+              </p:nextCondLst>
+            </p:seq>
+          </p:childTnLst>
+        </p:cTn>
+      </p:par>
+    </p:tnLst>
+    <p:bldLst>
+      <p:bldP spid="3" grpId="0" build="p"/>
+    </p:bldLst>
+  </p:timing>
 </p:sld>
 </file>
 
@@ -4518,6 +5702,186 @@
   <p:clrMapOvr>
     <a:masterClrMapping/>
   </p:clrMapOvr>
+  <p:timing>
+    <p:tnLst>
+      <p:par>
+        <p:cTn id="1" dur="indefinite" restart="never" nodeType="tmRoot">
+          <p:childTnLst>
+            <p:seq concurrent="1" nextAc="seek">
+              <p:cTn id="2" dur="indefinite" nodeType="mainSeq">
+                <p:childTnLst>
+                  <p:par>
+                    <p:cTn id="3" fill="hold">
+                      <p:stCondLst>
+                        <p:cond delay="indefinite"/>
+                      </p:stCondLst>
+                      <p:childTnLst>
+                        <p:par>
+                          <p:cTn id="4" fill="hold">
+                            <p:stCondLst>
+                              <p:cond delay="0"/>
+                            </p:stCondLst>
+                            <p:childTnLst>
+                              <p:par>
+                                <p:cTn id="5" presetID="1" presetClass="entr" presetSubtype="0" fill="hold" grpId="0" nodeType="clickEffect">
+                                  <p:stCondLst>
+                                    <p:cond delay="0"/>
+                                  </p:stCondLst>
+                                  <p:childTnLst>
+                                    <p:set>
+                                      <p:cBhvr>
+                                        <p:cTn id="6" dur="1" fill="hold">
+                                          <p:stCondLst>
+                                            <p:cond delay="0"/>
+                                          </p:stCondLst>
+                                        </p:cTn>
+                                        <p:tgtEl>
+                                          <p:spTgt spid="3">
+                                            <p:txEl>
+                                              <p:pRg st="0" end="0"/>
+                                            </p:txEl>
+                                          </p:spTgt>
+                                        </p:tgtEl>
+                                        <p:attrNameLst>
+                                          <p:attrName>style.visibility</p:attrName>
+                                        </p:attrNameLst>
+                                      </p:cBhvr>
+                                      <p:to>
+                                        <p:strVal val="visible"/>
+                                      </p:to>
+                                    </p:set>
+                                  </p:childTnLst>
+                                </p:cTn>
+                              </p:par>
+                            </p:childTnLst>
+                          </p:cTn>
+                        </p:par>
+                      </p:childTnLst>
+                    </p:cTn>
+                  </p:par>
+                  <p:par>
+                    <p:cTn id="7" fill="hold">
+                      <p:stCondLst>
+                        <p:cond delay="indefinite"/>
+                      </p:stCondLst>
+                      <p:childTnLst>
+                        <p:par>
+                          <p:cTn id="8" fill="hold">
+                            <p:stCondLst>
+                              <p:cond delay="0"/>
+                            </p:stCondLst>
+                            <p:childTnLst>
+                              <p:par>
+                                <p:cTn id="9" presetID="1" presetClass="entr" presetSubtype="0" fill="hold" grpId="0" nodeType="clickEffect">
+                                  <p:stCondLst>
+                                    <p:cond delay="0"/>
+                                  </p:stCondLst>
+                                  <p:childTnLst>
+                                    <p:set>
+                                      <p:cBhvr>
+                                        <p:cTn id="10" dur="1" fill="hold">
+                                          <p:stCondLst>
+                                            <p:cond delay="0"/>
+                                          </p:stCondLst>
+                                        </p:cTn>
+                                        <p:tgtEl>
+                                          <p:spTgt spid="3">
+                                            <p:txEl>
+                                              <p:pRg st="1" end="1"/>
+                                            </p:txEl>
+                                          </p:spTgt>
+                                        </p:tgtEl>
+                                        <p:attrNameLst>
+                                          <p:attrName>style.visibility</p:attrName>
+                                        </p:attrNameLst>
+                                      </p:cBhvr>
+                                      <p:to>
+                                        <p:strVal val="visible"/>
+                                      </p:to>
+                                    </p:set>
+                                  </p:childTnLst>
+                                </p:cTn>
+                              </p:par>
+                            </p:childTnLst>
+                          </p:cTn>
+                        </p:par>
+                      </p:childTnLst>
+                    </p:cTn>
+                  </p:par>
+                  <p:par>
+                    <p:cTn id="11" fill="hold">
+                      <p:stCondLst>
+                        <p:cond delay="indefinite"/>
+                      </p:stCondLst>
+                      <p:childTnLst>
+                        <p:par>
+                          <p:cTn id="12" fill="hold">
+                            <p:stCondLst>
+                              <p:cond delay="0"/>
+                            </p:stCondLst>
+                            <p:childTnLst>
+                              <p:par>
+                                <p:cTn id="13" presetID="1" presetClass="entr" presetSubtype="0" fill="hold" grpId="0" nodeType="clickEffect">
+                                  <p:stCondLst>
+                                    <p:cond delay="0"/>
+                                  </p:stCondLst>
+                                  <p:childTnLst>
+                                    <p:set>
+                                      <p:cBhvr>
+                                        <p:cTn id="14" dur="1" fill="hold">
+                                          <p:stCondLst>
+                                            <p:cond delay="0"/>
+                                          </p:stCondLst>
+                                        </p:cTn>
+                                        <p:tgtEl>
+                                          <p:spTgt spid="3">
+                                            <p:txEl>
+                                              <p:pRg st="2" end="2"/>
+                                            </p:txEl>
+                                          </p:spTgt>
+                                        </p:tgtEl>
+                                        <p:attrNameLst>
+                                          <p:attrName>style.visibility</p:attrName>
+                                        </p:attrNameLst>
+                                      </p:cBhvr>
+                                      <p:to>
+                                        <p:strVal val="visible"/>
+                                      </p:to>
+                                    </p:set>
+                                  </p:childTnLst>
+                                </p:cTn>
+                              </p:par>
+                            </p:childTnLst>
+                          </p:cTn>
+                        </p:par>
+                      </p:childTnLst>
+                    </p:cTn>
+                  </p:par>
+                </p:childTnLst>
+              </p:cTn>
+              <p:prevCondLst>
+                <p:cond evt="onPrev" delay="0">
+                  <p:tgtEl>
+                    <p:sldTgt/>
+                  </p:tgtEl>
+                </p:cond>
+              </p:prevCondLst>
+              <p:nextCondLst>
+                <p:cond evt="onNext" delay="0">
+                  <p:tgtEl>
+                    <p:sldTgt/>
+                  </p:tgtEl>
+                </p:cond>
+              </p:nextCondLst>
+            </p:seq>
+          </p:childTnLst>
+        </p:cTn>
+      </p:par>
+    </p:tnLst>
+    <p:bldLst>
+      <p:bldP spid="3" grpId="0" build="p"/>
+    </p:bldLst>
+  </p:timing>
 </p:sld>
 </file>
 
@@ -4736,6 +6100,199 @@
   <p:clrMapOvr>
     <a:masterClrMapping/>
   </p:clrMapOvr>
+  <p:timing>
+    <p:tnLst>
+      <p:par>
+        <p:cTn id="1" dur="indefinite" restart="never" nodeType="tmRoot">
+          <p:childTnLst>
+            <p:seq concurrent="1" nextAc="seek">
+              <p:cTn id="2" dur="indefinite" nodeType="mainSeq">
+                <p:childTnLst>
+                  <p:par>
+                    <p:cTn id="3" fill="hold">
+                      <p:stCondLst>
+                        <p:cond delay="indefinite"/>
+                      </p:stCondLst>
+                      <p:childTnLst>
+                        <p:par>
+                          <p:cTn id="4" fill="hold">
+                            <p:stCondLst>
+                              <p:cond delay="0"/>
+                            </p:stCondLst>
+                            <p:childTnLst>
+                              <p:par>
+                                <p:cTn id="5" presetID="1" presetClass="entr" presetSubtype="0" fill="hold" grpId="0" nodeType="clickEffect">
+                                  <p:stCondLst>
+                                    <p:cond delay="0"/>
+                                  </p:stCondLst>
+                                  <p:childTnLst>
+                                    <p:set>
+                                      <p:cBhvr>
+                                        <p:cTn id="6" dur="1" fill="hold">
+                                          <p:stCondLst>
+                                            <p:cond delay="0"/>
+                                          </p:stCondLst>
+                                        </p:cTn>
+                                        <p:tgtEl>
+                                          <p:spTgt spid="3">
+                                            <p:txEl>
+                                              <p:pRg st="0" end="0"/>
+                                            </p:txEl>
+                                          </p:spTgt>
+                                        </p:tgtEl>
+                                        <p:attrNameLst>
+                                          <p:attrName>style.visibility</p:attrName>
+                                        </p:attrNameLst>
+                                      </p:cBhvr>
+                                      <p:to>
+                                        <p:strVal val="visible"/>
+                                      </p:to>
+                                    </p:set>
+                                  </p:childTnLst>
+                                </p:cTn>
+                              </p:par>
+                              <p:par>
+                                <p:cTn id="7" presetID="1" presetClass="entr" presetSubtype="0" fill="hold" grpId="0" nodeType="withEffect">
+                                  <p:stCondLst>
+                                    <p:cond delay="0"/>
+                                  </p:stCondLst>
+                                  <p:childTnLst>
+                                    <p:set>
+                                      <p:cBhvr>
+                                        <p:cTn id="8" dur="1" fill="hold">
+                                          <p:stCondLst>
+                                            <p:cond delay="0"/>
+                                          </p:stCondLst>
+                                        </p:cTn>
+                                        <p:tgtEl>
+                                          <p:spTgt spid="3">
+                                            <p:txEl>
+                                              <p:pRg st="1" end="1"/>
+                                            </p:txEl>
+                                          </p:spTgt>
+                                        </p:tgtEl>
+                                        <p:attrNameLst>
+                                          <p:attrName>style.visibility</p:attrName>
+                                        </p:attrNameLst>
+                                      </p:cBhvr>
+                                      <p:to>
+                                        <p:strVal val="visible"/>
+                                      </p:to>
+                                    </p:set>
+                                  </p:childTnLst>
+                                </p:cTn>
+                              </p:par>
+                            </p:childTnLst>
+                          </p:cTn>
+                        </p:par>
+                      </p:childTnLst>
+                    </p:cTn>
+                  </p:par>
+                  <p:par>
+                    <p:cTn id="9" fill="hold">
+                      <p:stCondLst>
+                        <p:cond delay="indefinite"/>
+                      </p:stCondLst>
+                      <p:childTnLst>
+                        <p:par>
+                          <p:cTn id="10" fill="hold">
+                            <p:stCondLst>
+                              <p:cond delay="0"/>
+                            </p:stCondLst>
+                            <p:childTnLst>
+                              <p:par>
+                                <p:cTn id="11" presetID="1" presetClass="entr" presetSubtype="0" fill="hold" grpId="0" nodeType="clickEffect">
+                                  <p:stCondLst>
+                                    <p:cond delay="0"/>
+                                  </p:stCondLst>
+                                  <p:childTnLst>
+                                    <p:set>
+                                      <p:cBhvr>
+                                        <p:cTn id="12" dur="1" fill="hold">
+                                          <p:stCondLst>
+                                            <p:cond delay="0"/>
+                                          </p:stCondLst>
+                                        </p:cTn>
+                                        <p:tgtEl>
+                                          <p:spTgt spid="3">
+                                            <p:txEl>
+                                              <p:pRg st="2" end="2"/>
+                                            </p:txEl>
+                                          </p:spTgt>
+                                        </p:tgtEl>
+                                        <p:attrNameLst>
+                                          <p:attrName>style.visibility</p:attrName>
+                                        </p:attrNameLst>
+                                      </p:cBhvr>
+                                      <p:to>
+                                        <p:strVal val="visible"/>
+                                      </p:to>
+                                    </p:set>
+                                  </p:childTnLst>
+                                </p:cTn>
+                              </p:par>
+                              <p:par>
+                                <p:cTn id="13" presetID="1" presetClass="entr" presetSubtype="0" fill="hold" grpId="0" nodeType="withEffect">
+                                  <p:stCondLst>
+                                    <p:cond delay="0"/>
+                                  </p:stCondLst>
+                                  <p:childTnLst>
+                                    <p:set>
+                                      <p:cBhvr>
+                                        <p:cTn id="14" dur="1" fill="hold">
+                                          <p:stCondLst>
+                                            <p:cond delay="0"/>
+                                          </p:stCondLst>
+                                        </p:cTn>
+                                        <p:tgtEl>
+                                          <p:spTgt spid="3">
+                                            <p:txEl>
+                                              <p:pRg st="3" end="3"/>
+                                            </p:txEl>
+                                          </p:spTgt>
+                                        </p:tgtEl>
+                                        <p:attrNameLst>
+                                          <p:attrName>style.visibility</p:attrName>
+                                        </p:attrNameLst>
+                                      </p:cBhvr>
+                                      <p:to>
+                                        <p:strVal val="visible"/>
+                                      </p:to>
+                                    </p:set>
+                                  </p:childTnLst>
+                                </p:cTn>
+                              </p:par>
+                            </p:childTnLst>
+                          </p:cTn>
+                        </p:par>
+                      </p:childTnLst>
+                    </p:cTn>
+                  </p:par>
+                </p:childTnLst>
+              </p:cTn>
+              <p:prevCondLst>
+                <p:cond evt="onPrev" delay="0">
+                  <p:tgtEl>
+                    <p:sldTgt/>
+                  </p:tgtEl>
+                </p:cond>
+              </p:prevCondLst>
+              <p:nextCondLst>
+                <p:cond evt="onNext" delay="0">
+                  <p:tgtEl>
+                    <p:sldTgt/>
+                  </p:tgtEl>
+                </p:cond>
+              </p:nextCondLst>
+            </p:seq>
+          </p:childTnLst>
+        </p:cTn>
+      </p:par>
+    </p:tnLst>
+    <p:bldLst>
+      <p:bldP spid="3" grpId="0" build="p"/>
+    </p:bldLst>
+  </p:timing>
 </p:sld>
 </file>
 
@@ -4896,6 +6453,199 @@
   <p:clrMapOvr>
     <a:masterClrMapping/>
   </p:clrMapOvr>
+  <p:timing>
+    <p:tnLst>
+      <p:par>
+        <p:cTn id="1" dur="indefinite" restart="never" nodeType="tmRoot">
+          <p:childTnLst>
+            <p:seq concurrent="1" nextAc="seek">
+              <p:cTn id="2" dur="indefinite" nodeType="mainSeq">
+                <p:childTnLst>
+                  <p:par>
+                    <p:cTn id="3" fill="hold">
+                      <p:stCondLst>
+                        <p:cond delay="indefinite"/>
+                      </p:stCondLst>
+                      <p:childTnLst>
+                        <p:par>
+                          <p:cTn id="4" fill="hold">
+                            <p:stCondLst>
+                              <p:cond delay="0"/>
+                            </p:stCondLst>
+                            <p:childTnLst>
+                              <p:par>
+                                <p:cTn id="5" presetID="1" presetClass="entr" presetSubtype="0" fill="hold" grpId="0" nodeType="clickEffect">
+                                  <p:stCondLst>
+                                    <p:cond delay="0"/>
+                                  </p:stCondLst>
+                                  <p:childTnLst>
+                                    <p:set>
+                                      <p:cBhvr>
+                                        <p:cTn id="6" dur="1" fill="hold">
+                                          <p:stCondLst>
+                                            <p:cond delay="0"/>
+                                          </p:stCondLst>
+                                        </p:cTn>
+                                        <p:tgtEl>
+                                          <p:spTgt spid="3">
+                                            <p:txEl>
+                                              <p:pRg st="0" end="0"/>
+                                            </p:txEl>
+                                          </p:spTgt>
+                                        </p:tgtEl>
+                                        <p:attrNameLst>
+                                          <p:attrName>style.visibility</p:attrName>
+                                        </p:attrNameLst>
+                                      </p:cBhvr>
+                                      <p:to>
+                                        <p:strVal val="visible"/>
+                                      </p:to>
+                                    </p:set>
+                                  </p:childTnLst>
+                                </p:cTn>
+                              </p:par>
+                              <p:par>
+                                <p:cTn id="7" presetID="1" presetClass="entr" presetSubtype="0" fill="hold" grpId="0" nodeType="withEffect">
+                                  <p:stCondLst>
+                                    <p:cond delay="0"/>
+                                  </p:stCondLst>
+                                  <p:childTnLst>
+                                    <p:set>
+                                      <p:cBhvr>
+                                        <p:cTn id="8" dur="1" fill="hold">
+                                          <p:stCondLst>
+                                            <p:cond delay="0"/>
+                                          </p:stCondLst>
+                                        </p:cTn>
+                                        <p:tgtEl>
+                                          <p:spTgt spid="3">
+                                            <p:txEl>
+                                              <p:pRg st="1" end="1"/>
+                                            </p:txEl>
+                                          </p:spTgt>
+                                        </p:tgtEl>
+                                        <p:attrNameLst>
+                                          <p:attrName>style.visibility</p:attrName>
+                                        </p:attrNameLst>
+                                      </p:cBhvr>
+                                      <p:to>
+                                        <p:strVal val="visible"/>
+                                      </p:to>
+                                    </p:set>
+                                  </p:childTnLst>
+                                </p:cTn>
+                              </p:par>
+                            </p:childTnLst>
+                          </p:cTn>
+                        </p:par>
+                      </p:childTnLst>
+                    </p:cTn>
+                  </p:par>
+                  <p:par>
+                    <p:cTn id="9" fill="hold">
+                      <p:stCondLst>
+                        <p:cond delay="indefinite"/>
+                      </p:stCondLst>
+                      <p:childTnLst>
+                        <p:par>
+                          <p:cTn id="10" fill="hold">
+                            <p:stCondLst>
+                              <p:cond delay="0"/>
+                            </p:stCondLst>
+                            <p:childTnLst>
+                              <p:par>
+                                <p:cTn id="11" presetID="1" presetClass="entr" presetSubtype="0" fill="hold" grpId="0" nodeType="clickEffect">
+                                  <p:stCondLst>
+                                    <p:cond delay="0"/>
+                                  </p:stCondLst>
+                                  <p:childTnLst>
+                                    <p:set>
+                                      <p:cBhvr>
+                                        <p:cTn id="12" dur="1" fill="hold">
+                                          <p:stCondLst>
+                                            <p:cond delay="0"/>
+                                          </p:stCondLst>
+                                        </p:cTn>
+                                        <p:tgtEl>
+                                          <p:spTgt spid="3">
+                                            <p:txEl>
+                                              <p:pRg st="2" end="2"/>
+                                            </p:txEl>
+                                          </p:spTgt>
+                                        </p:tgtEl>
+                                        <p:attrNameLst>
+                                          <p:attrName>style.visibility</p:attrName>
+                                        </p:attrNameLst>
+                                      </p:cBhvr>
+                                      <p:to>
+                                        <p:strVal val="visible"/>
+                                      </p:to>
+                                    </p:set>
+                                  </p:childTnLst>
+                                </p:cTn>
+                              </p:par>
+                              <p:par>
+                                <p:cTn id="13" presetID="1" presetClass="entr" presetSubtype="0" fill="hold" grpId="0" nodeType="withEffect">
+                                  <p:stCondLst>
+                                    <p:cond delay="0"/>
+                                  </p:stCondLst>
+                                  <p:childTnLst>
+                                    <p:set>
+                                      <p:cBhvr>
+                                        <p:cTn id="14" dur="1" fill="hold">
+                                          <p:stCondLst>
+                                            <p:cond delay="0"/>
+                                          </p:stCondLst>
+                                        </p:cTn>
+                                        <p:tgtEl>
+                                          <p:spTgt spid="3">
+                                            <p:txEl>
+                                              <p:pRg st="3" end="3"/>
+                                            </p:txEl>
+                                          </p:spTgt>
+                                        </p:tgtEl>
+                                        <p:attrNameLst>
+                                          <p:attrName>style.visibility</p:attrName>
+                                        </p:attrNameLst>
+                                      </p:cBhvr>
+                                      <p:to>
+                                        <p:strVal val="visible"/>
+                                      </p:to>
+                                    </p:set>
+                                  </p:childTnLst>
+                                </p:cTn>
+                              </p:par>
+                            </p:childTnLst>
+                          </p:cTn>
+                        </p:par>
+                      </p:childTnLst>
+                    </p:cTn>
+                  </p:par>
+                </p:childTnLst>
+              </p:cTn>
+              <p:prevCondLst>
+                <p:cond evt="onPrev" delay="0">
+                  <p:tgtEl>
+                    <p:sldTgt/>
+                  </p:tgtEl>
+                </p:cond>
+              </p:prevCondLst>
+              <p:nextCondLst>
+                <p:cond evt="onNext" delay="0">
+                  <p:tgtEl>
+                    <p:sldTgt/>
+                  </p:tgtEl>
+                </p:cond>
+              </p:nextCondLst>
+            </p:seq>
+          </p:childTnLst>
+        </p:cTn>
+      </p:par>
+    </p:tnLst>
+    <p:bldLst>
+      <p:bldP spid="3" grpId="0" build="p"/>
+    </p:bldLst>
+  </p:timing>
 </p:sld>
 </file>
 
@@ -5031,6 +6781,261 @@
   <p:clrMapOvr>
     <a:masterClrMapping/>
   </p:clrMapOvr>
+  <p:timing>
+    <p:tnLst>
+      <p:par>
+        <p:cTn id="1" dur="indefinite" restart="never" nodeType="tmRoot">
+          <p:childTnLst>
+            <p:seq concurrent="1" nextAc="seek">
+              <p:cTn id="2" dur="indefinite" nodeType="mainSeq">
+                <p:childTnLst>
+                  <p:par>
+                    <p:cTn id="3" fill="hold">
+                      <p:stCondLst>
+                        <p:cond delay="indefinite"/>
+                      </p:stCondLst>
+                      <p:childTnLst>
+                        <p:par>
+                          <p:cTn id="4" fill="hold">
+                            <p:stCondLst>
+                              <p:cond delay="0"/>
+                            </p:stCondLst>
+                            <p:childTnLst>
+                              <p:par>
+                                <p:cTn id="5" presetID="1" presetClass="entr" presetSubtype="0" fill="hold" grpId="0" nodeType="clickEffect">
+                                  <p:stCondLst>
+                                    <p:cond delay="0"/>
+                                  </p:stCondLst>
+                                  <p:childTnLst>
+                                    <p:set>
+                                      <p:cBhvr>
+                                        <p:cTn id="6" dur="1" fill="hold">
+                                          <p:stCondLst>
+                                            <p:cond delay="0"/>
+                                          </p:stCondLst>
+                                        </p:cTn>
+                                        <p:tgtEl>
+                                          <p:spTgt spid="3">
+                                            <p:txEl>
+                                              <p:pRg st="0" end="0"/>
+                                            </p:txEl>
+                                          </p:spTgt>
+                                        </p:tgtEl>
+                                        <p:attrNameLst>
+                                          <p:attrName>style.visibility</p:attrName>
+                                        </p:attrNameLst>
+                                      </p:cBhvr>
+                                      <p:to>
+                                        <p:strVal val="visible"/>
+                                      </p:to>
+                                    </p:set>
+                                  </p:childTnLst>
+                                </p:cTn>
+                              </p:par>
+                            </p:childTnLst>
+                          </p:cTn>
+                        </p:par>
+                      </p:childTnLst>
+                    </p:cTn>
+                  </p:par>
+                  <p:par>
+                    <p:cTn id="7" fill="hold">
+                      <p:stCondLst>
+                        <p:cond delay="indefinite"/>
+                      </p:stCondLst>
+                      <p:childTnLst>
+                        <p:par>
+                          <p:cTn id="8" fill="hold">
+                            <p:stCondLst>
+                              <p:cond delay="0"/>
+                            </p:stCondLst>
+                            <p:childTnLst>
+                              <p:par>
+                                <p:cTn id="9" presetID="1" presetClass="entr" presetSubtype="0" fill="hold" grpId="0" nodeType="clickEffect">
+                                  <p:stCondLst>
+                                    <p:cond delay="0"/>
+                                  </p:stCondLst>
+                                  <p:childTnLst>
+                                    <p:set>
+                                      <p:cBhvr>
+                                        <p:cTn id="10" dur="1" fill="hold">
+                                          <p:stCondLst>
+                                            <p:cond delay="0"/>
+                                          </p:stCondLst>
+                                        </p:cTn>
+                                        <p:tgtEl>
+                                          <p:spTgt spid="3">
+                                            <p:txEl>
+                                              <p:pRg st="1" end="1"/>
+                                            </p:txEl>
+                                          </p:spTgt>
+                                        </p:tgtEl>
+                                        <p:attrNameLst>
+                                          <p:attrName>style.visibility</p:attrName>
+                                        </p:attrNameLst>
+                                      </p:cBhvr>
+                                      <p:to>
+                                        <p:strVal val="visible"/>
+                                      </p:to>
+                                    </p:set>
+                                  </p:childTnLst>
+                                </p:cTn>
+                              </p:par>
+                              <p:par>
+                                <p:cTn id="11" presetID="1" presetClass="entr" presetSubtype="0" fill="hold" grpId="0" nodeType="withEffect">
+                                  <p:stCondLst>
+                                    <p:cond delay="0"/>
+                                  </p:stCondLst>
+                                  <p:childTnLst>
+                                    <p:set>
+                                      <p:cBhvr>
+                                        <p:cTn id="12" dur="1" fill="hold">
+                                          <p:stCondLst>
+                                            <p:cond delay="0"/>
+                                          </p:stCondLst>
+                                        </p:cTn>
+                                        <p:tgtEl>
+                                          <p:spTgt spid="3">
+                                            <p:txEl>
+                                              <p:pRg st="2" end="2"/>
+                                            </p:txEl>
+                                          </p:spTgt>
+                                        </p:tgtEl>
+                                        <p:attrNameLst>
+                                          <p:attrName>style.visibility</p:attrName>
+                                        </p:attrNameLst>
+                                      </p:cBhvr>
+                                      <p:to>
+                                        <p:strVal val="visible"/>
+                                      </p:to>
+                                    </p:set>
+                                  </p:childTnLst>
+                                </p:cTn>
+                              </p:par>
+                              <p:par>
+                                <p:cTn id="13" presetID="1" presetClass="entr" presetSubtype="0" fill="hold" grpId="0" nodeType="withEffect">
+                                  <p:stCondLst>
+                                    <p:cond delay="0"/>
+                                  </p:stCondLst>
+                                  <p:childTnLst>
+                                    <p:set>
+                                      <p:cBhvr>
+                                        <p:cTn id="14" dur="1" fill="hold">
+                                          <p:stCondLst>
+                                            <p:cond delay="0"/>
+                                          </p:stCondLst>
+                                        </p:cTn>
+                                        <p:tgtEl>
+                                          <p:spTgt spid="3">
+                                            <p:txEl>
+                                              <p:pRg st="3" end="3"/>
+                                            </p:txEl>
+                                          </p:spTgt>
+                                        </p:tgtEl>
+                                        <p:attrNameLst>
+                                          <p:attrName>style.visibility</p:attrName>
+                                        </p:attrNameLst>
+                                      </p:cBhvr>
+                                      <p:to>
+                                        <p:strVal val="visible"/>
+                                      </p:to>
+                                    </p:set>
+                                  </p:childTnLst>
+                                </p:cTn>
+                              </p:par>
+                              <p:par>
+                                <p:cTn id="15" presetID="1" presetClass="entr" presetSubtype="0" fill="hold" grpId="0" nodeType="withEffect">
+                                  <p:stCondLst>
+                                    <p:cond delay="0"/>
+                                  </p:stCondLst>
+                                  <p:childTnLst>
+                                    <p:set>
+                                      <p:cBhvr>
+                                        <p:cTn id="16" dur="1" fill="hold">
+                                          <p:stCondLst>
+                                            <p:cond delay="0"/>
+                                          </p:stCondLst>
+                                        </p:cTn>
+                                        <p:tgtEl>
+                                          <p:spTgt spid="3">
+                                            <p:txEl>
+                                              <p:pRg st="4" end="4"/>
+                                            </p:txEl>
+                                          </p:spTgt>
+                                        </p:tgtEl>
+                                        <p:attrNameLst>
+                                          <p:attrName>style.visibility</p:attrName>
+                                        </p:attrNameLst>
+                                      </p:cBhvr>
+                                      <p:to>
+                                        <p:strVal val="visible"/>
+                                      </p:to>
+                                    </p:set>
+                                  </p:childTnLst>
+                                </p:cTn>
+                              </p:par>
+                              <p:par>
+                                <p:cTn id="17" presetID="1" presetClass="entr" presetSubtype="0" fill="hold" grpId="0" nodeType="withEffect">
+                                  <p:stCondLst>
+                                    <p:cond delay="0"/>
+                                  </p:stCondLst>
+                                  <p:childTnLst>
+                                    <p:set>
+                                      <p:cBhvr>
+                                        <p:cTn id="18" dur="1" fill="hold">
+                                          <p:stCondLst>
+                                            <p:cond delay="0"/>
+                                          </p:stCondLst>
+                                        </p:cTn>
+                                        <p:tgtEl>
+                                          <p:spTgt spid="3">
+                                            <p:txEl>
+                                              <p:pRg st="5" end="5"/>
+                                            </p:txEl>
+                                          </p:spTgt>
+                                        </p:tgtEl>
+                                        <p:attrNameLst>
+                                          <p:attrName>style.visibility</p:attrName>
+                                        </p:attrNameLst>
+                                      </p:cBhvr>
+                                      <p:to>
+                                        <p:strVal val="visible"/>
+                                      </p:to>
+                                    </p:set>
+                                  </p:childTnLst>
+                                </p:cTn>
+                              </p:par>
+                            </p:childTnLst>
+                          </p:cTn>
+                        </p:par>
+                      </p:childTnLst>
+                    </p:cTn>
+                  </p:par>
+                </p:childTnLst>
+              </p:cTn>
+              <p:prevCondLst>
+                <p:cond evt="onPrev" delay="0">
+                  <p:tgtEl>
+                    <p:sldTgt/>
+                  </p:tgtEl>
+                </p:cond>
+              </p:prevCondLst>
+              <p:nextCondLst>
+                <p:cond evt="onNext" delay="0">
+                  <p:tgtEl>
+                    <p:sldTgt/>
+                  </p:tgtEl>
+                </p:cond>
+              </p:nextCondLst>
+            </p:seq>
+          </p:childTnLst>
+        </p:cTn>
+      </p:par>
+    </p:tnLst>
+    <p:bldLst>
+      <p:bldP spid="3" grpId="0" build="p"/>
+    </p:bldLst>
+  </p:timing>
 </p:sld>
 </file>
 

</xml_diff>

<commit_message>
Updates to Spring Framework unit testing support
</commit_message>
<xml_diff>
--- a/presentations/Introduction to Spring Framework Unit Testing Support.pptx
+++ b/presentations/Introduction to Spring Framework Unit Testing Support.pptx
@@ -270,7 +270,7 @@
           <a:p>
             <a:fld id="{B38EF465-D677-F140-82CD-891C0463380E}" type="datetimeFigureOut">
               <a:rPr lang="en-US" smtClean="0"/>
-              <a:t>11/2/21</a:t>
+              <a:t>11/10/21</a:t>
             </a:fld>
             <a:endParaRPr lang="en-US"/>
           </a:p>
@@ -468,7 +468,7 @@
           <a:p>
             <a:fld id="{B38EF465-D677-F140-82CD-891C0463380E}" type="datetimeFigureOut">
               <a:rPr lang="en-US" smtClean="0"/>
-              <a:t>11/2/21</a:t>
+              <a:t>11/10/21</a:t>
             </a:fld>
             <a:endParaRPr lang="en-US"/>
           </a:p>
@@ -676,7 +676,7 @@
           <a:p>
             <a:fld id="{B38EF465-D677-F140-82CD-891C0463380E}" type="datetimeFigureOut">
               <a:rPr lang="en-US" smtClean="0"/>
-              <a:t>11/2/21</a:t>
+              <a:t>11/10/21</a:t>
             </a:fld>
             <a:endParaRPr lang="en-US"/>
           </a:p>
@@ -874,7 +874,7 @@
           <a:p>
             <a:fld id="{B38EF465-D677-F140-82CD-891C0463380E}" type="datetimeFigureOut">
               <a:rPr lang="en-US" smtClean="0"/>
-              <a:t>11/2/21</a:t>
+              <a:t>11/10/21</a:t>
             </a:fld>
             <a:endParaRPr lang="en-US"/>
           </a:p>
@@ -1149,7 +1149,7 @@
           <a:p>
             <a:fld id="{B38EF465-D677-F140-82CD-891C0463380E}" type="datetimeFigureOut">
               <a:rPr lang="en-US" smtClean="0"/>
-              <a:t>11/2/21</a:t>
+              <a:t>11/10/21</a:t>
             </a:fld>
             <a:endParaRPr lang="en-US"/>
           </a:p>
@@ -1414,7 +1414,7 @@
           <a:p>
             <a:fld id="{B38EF465-D677-F140-82CD-891C0463380E}" type="datetimeFigureOut">
               <a:rPr lang="en-US" smtClean="0"/>
-              <a:t>11/2/21</a:t>
+              <a:t>11/10/21</a:t>
             </a:fld>
             <a:endParaRPr lang="en-US"/>
           </a:p>
@@ -1826,7 +1826,7 @@
           <a:p>
             <a:fld id="{B38EF465-D677-F140-82CD-891C0463380E}" type="datetimeFigureOut">
               <a:rPr lang="en-US" smtClean="0"/>
-              <a:t>11/2/21</a:t>
+              <a:t>11/10/21</a:t>
             </a:fld>
             <a:endParaRPr lang="en-US"/>
           </a:p>
@@ -1967,7 +1967,7 @@
           <a:p>
             <a:fld id="{B38EF465-D677-F140-82CD-891C0463380E}" type="datetimeFigureOut">
               <a:rPr lang="en-US" smtClean="0"/>
-              <a:t>11/2/21</a:t>
+              <a:t>11/10/21</a:t>
             </a:fld>
             <a:endParaRPr lang="en-US"/>
           </a:p>
@@ -2080,7 +2080,7 @@
           <a:p>
             <a:fld id="{B38EF465-D677-F140-82CD-891C0463380E}" type="datetimeFigureOut">
               <a:rPr lang="en-US" smtClean="0"/>
-              <a:t>11/2/21</a:t>
+              <a:t>11/10/21</a:t>
             </a:fld>
             <a:endParaRPr lang="en-US"/>
           </a:p>
@@ -2391,7 +2391,7 @@
           <a:p>
             <a:fld id="{B38EF465-D677-F140-82CD-891C0463380E}" type="datetimeFigureOut">
               <a:rPr lang="en-US" smtClean="0"/>
-              <a:t>11/2/21</a:t>
+              <a:t>11/10/21</a:t>
             </a:fld>
             <a:endParaRPr lang="en-US"/>
           </a:p>
@@ -2679,7 +2679,7 @@
           <a:p>
             <a:fld id="{B38EF465-D677-F140-82CD-891C0463380E}" type="datetimeFigureOut">
               <a:rPr lang="en-US" smtClean="0"/>
-              <a:t>11/2/21</a:t>
+              <a:t>11/10/21</a:t>
             </a:fld>
             <a:endParaRPr lang="en-US"/>
           </a:p>
@@ -2920,7 +2920,7 @@
           <a:p>
             <a:fld id="{B38EF465-D677-F140-82CD-891C0463380E}" type="datetimeFigureOut">
               <a:rPr lang="en-US" smtClean="0"/>
-              <a:t>11/2/21</a:t>
+              <a:t>11/10/21</a:t>
             </a:fld>
             <a:endParaRPr lang="en-US"/>
           </a:p>
@@ -3410,6 +3410,38 @@
               <a:rPr lang="en-US" dirty="0"/>
               <a:t>Christopher Bartling</a:t>
             </a:r>
+          </a:p>
+        </p:txBody>
+      </p:sp>
+      <p:sp>
+        <p:nvSpPr>
+          <p:cNvPr id="4" name="TextBox 3">
+            <a:extLst>
+              <a:ext uri="{FF2B5EF4-FFF2-40B4-BE49-F238E27FC236}">
+                <a16:creationId xmlns:a16="http://schemas.microsoft.com/office/drawing/2014/main" id="{CDBED4B7-C65A-D34F-ABA0-E883778E954F}"/>
+              </a:ext>
+            </a:extLst>
+          </p:cNvPr>
+          <p:cNvSpPr txBox="1"/>
+          <p:nvPr/>
+        </p:nvSpPr>
+        <p:spPr>
+          <a:xfrm>
+            <a:off x="10268857" y="972457"/>
+            <a:ext cx="184731" cy="369332"/>
+          </a:xfrm>
+          <a:prstGeom prst="rect">
+            <a:avLst/>
+          </a:prstGeom>
+          <a:noFill/>
+        </p:spPr>
+        <p:txBody>
+          <a:bodyPr wrap="none" rtlCol="0">
+            <a:spAutoFit/>
+          </a:bodyPr>
+          <a:lstStyle/>
+          <a:p>
+            <a:endParaRPr lang="en-US" dirty="0"/>
           </a:p>
         </p:txBody>
       </p:sp>

</xml_diff>